<commit_message>
Changes in CR_ecPoint_product figure
</commit_message>
<xml_diff>
--- a/manuscript/Figures/CR_ecPoint_product.pptx
+++ b/manuscript/Figures/CR_ecPoint_product.pptx
@@ -2,7 +2,7 @@
 <file path=ppt/presentation.xml><?xml version="1.0" encoding="utf-8"?>
 <p:presentation xmlns:a="http://schemas.openxmlformats.org/drawingml/2006/main" xmlns:r="http://schemas.openxmlformats.org/officeDocument/2006/relationships" xmlns:p="http://schemas.openxmlformats.org/presentationml/2006/main" saveSubsetFonts="1">
   <p:sldMasterIdLst>
-    <p:sldMasterId id="2147483660" r:id="rId1"/>
+    <p:sldMasterId id="2147483672" r:id="rId1"/>
   </p:sldMasterIdLst>
   <p:notesMasterIdLst>
     <p:notesMasterId r:id="rId3"/>
@@ -10,7 +10,7 @@
   <p:sldIdLst>
     <p:sldId id="262" r:id="rId2"/>
   </p:sldIdLst>
-  <p:sldSz cx="6858000" cy="9906000" type="A4"/>
+  <p:sldSz cx="6372225" cy="5651500"/>
   <p:notesSz cx="6742113" cy="9872663"/>
   <p:defaultTextStyle>
     <a:defPPr>
@@ -115,6 +115,14 @@
 </p:presentation>
 </file>
 
+<file path=ppt/revisionInfo.xml><?xml version="1.0" encoding="utf-8"?>
+<p1510:revInfo xmlns:a="http://schemas.openxmlformats.org/drawingml/2006/main" xmlns:r="http://schemas.openxmlformats.org/officeDocument/2006/relationships" xmlns:p1510="http://schemas.microsoft.com/office/powerpoint/2015/10/main">
+  <p1510:revLst>
+    <p1510:client id="{4141B046-8B73-4D1D-9A15-713BF63B7BF4}" v="2" dt="2021-01-22T15:18:42.101"/>
+  </p1510:revLst>
+</p1510:revInfo>
+</file>
+
 <file path=ppt/changesInfos/changesInfo1.xml><?xml version="1.0" encoding="utf-8"?>
 <pc:chgInfo xmlns:a="http://schemas.openxmlformats.org/drawingml/2006/main" xmlns:r="http://schemas.openxmlformats.org/officeDocument/2006/relationships" xmlns:ac="http://schemas.microsoft.com/office/drawing/2013/main/command" xmlns:pc="http://schemas.microsoft.com/office/powerpoint/2013/main/command">
   <pc:docChgLst>
@@ -1993,11 +2001,298 @@
   </pc:docChgLst>
   <pc:docChgLst>
     <pc:chgData name="Fatima Pillosu" userId="a6295d4dc9e22643" providerId="LiveId" clId="{4141B046-8B73-4D1D-9A15-713BF63B7BF4}"/>
-    <pc:docChg chg="delSld">
-      <pc:chgData name="Fatima Pillosu" userId="a6295d4dc9e22643" providerId="LiveId" clId="{4141B046-8B73-4D1D-9A15-713BF63B7BF4}" dt="2020-12-03T10:10:23.538" v="4" actId="2696"/>
+    <pc:docChg chg="custSel delSld modSld">
+      <pc:chgData name="Fatima Pillosu" userId="a6295d4dc9e22643" providerId="LiveId" clId="{4141B046-8B73-4D1D-9A15-713BF63B7BF4}" dt="2021-01-22T15:18:42.101" v="55"/>
       <pc:docMkLst>
         <pc:docMk/>
       </pc:docMkLst>
+      <pc:sldChg chg="addSp delSp modSp mod">
+        <pc:chgData name="Fatima Pillosu" userId="a6295d4dc9e22643" providerId="LiveId" clId="{4141B046-8B73-4D1D-9A15-713BF63B7BF4}" dt="2021-01-22T15:18:42.101" v="55"/>
+        <pc:sldMkLst>
+          <pc:docMk/>
+          <pc:sldMk cId="1544177429" sldId="262"/>
+        </pc:sldMkLst>
+        <pc:spChg chg="del mod">
+          <ac:chgData name="Fatima Pillosu" userId="a6295d4dc9e22643" providerId="LiveId" clId="{4141B046-8B73-4D1D-9A15-713BF63B7BF4}" dt="2021-01-22T15:18:21.900" v="54" actId="21"/>
+          <ac:spMkLst>
+            <pc:docMk/>
+            <pc:sldMk cId="1544177429" sldId="262"/>
+            <ac:spMk id="7" creationId="{E2E634FE-00B6-413D-86F2-E09E1E2C0E78}"/>
+          </ac:spMkLst>
+        </pc:spChg>
+        <pc:spChg chg="del mod">
+          <ac:chgData name="Fatima Pillosu" userId="a6295d4dc9e22643" providerId="LiveId" clId="{4141B046-8B73-4D1D-9A15-713BF63B7BF4}" dt="2021-01-22T15:18:21.900" v="54" actId="21"/>
+          <ac:spMkLst>
+            <pc:docMk/>
+            <pc:sldMk cId="1544177429" sldId="262"/>
+            <ac:spMk id="8" creationId="{2926EFA7-3AD0-46E7-943D-4C5A042CEC60}"/>
+          </ac:spMkLst>
+        </pc:spChg>
+        <pc:spChg chg="del mod">
+          <ac:chgData name="Fatima Pillosu" userId="a6295d4dc9e22643" providerId="LiveId" clId="{4141B046-8B73-4D1D-9A15-713BF63B7BF4}" dt="2021-01-22T15:18:21.900" v="54" actId="21"/>
+          <ac:spMkLst>
+            <pc:docMk/>
+            <pc:sldMk cId="1544177429" sldId="262"/>
+            <ac:spMk id="9" creationId="{617555FA-67B3-448B-879D-95A44DEBF33F}"/>
+          </ac:spMkLst>
+        </pc:spChg>
+        <pc:spChg chg="del mod">
+          <ac:chgData name="Fatima Pillosu" userId="a6295d4dc9e22643" providerId="LiveId" clId="{4141B046-8B73-4D1D-9A15-713BF63B7BF4}" dt="2021-01-22T15:18:21.900" v="54" actId="21"/>
+          <ac:spMkLst>
+            <pc:docMk/>
+            <pc:sldMk cId="1544177429" sldId="262"/>
+            <ac:spMk id="10" creationId="{6CBFCAE6-AC62-4671-96C1-432C5749466E}"/>
+          </ac:spMkLst>
+        </pc:spChg>
+        <pc:spChg chg="del mod">
+          <ac:chgData name="Fatima Pillosu" userId="a6295d4dc9e22643" providerId="LiveId" clId="{4141B046-8B73-4D1D-9A15-713BF63B7BF4}" dt="2021-01-22T15:18:21.900" v="54" actId="21"/>
+          <ac:spMkLst>
+            <pc:docMk/>
+            <pc:sldMk cId="1544177429" sldId="262"/>
+            <ac:spMk id="11" creationId="{A1603981-D9F7-438A-B23E-C3488A35C546}"/>
+          </ac:spMkLst>
+        </pc:spChg>
+        <pc:spChg chg="del mod">
+          <ac:chgData name="Fatima Pillosu" userId="a6295d4dc9e22643" providerId="LiveId" clId="{4141B046-8B73-4D1D-9A15-713BF63B7BF4}" dt="2021-01-22T15:18:21.900" v="54" actId="21"/>
+          <ac:spMkLst>
+            <pc:docMk/>
+            <pc:sldMk cId="1544177429" sldId="262"/>
+            <ac:spMk id="12" creationId="{CBF652F5-26AA-4C82-8C28-0944A2A23360}"/>
+          </ac:spMkLst>
+        </pc:spChg>
+        <pc:spChg chg="del mod">
+          <ac:chgData name="Fatima Pillosu" userId="a6295d4dc9e22643" providerId="LiveId" clId="{4141B046-8B73-4D1D-9A15-713BF63B7BF4}" dt="2021-01-22T15:18:21.900" v="54" actId="21"/>
+          <ac:spMkLst>
+            <pc:docMk/>
+            <pc:sldMk cId="1544177429" sldId="262"/>
+            <ac:spMk id="13" creationId="{1A757164-0531-4C8E-9583-91FD51B3C001}"/>
+          </ac:spMkLst>
+        </pc:spChg>
+        <pc:spChg chg="del mod">
+          <ac:chgData name="Fatima Pillosu" userId="a6295d4dc9e22643" providerId="LiveId" clId="{4141B046-8B73-4D1D-9A15-713BF63B7BF4}" dt="2021-01-22T15:18:21.900" v="54" actId="21"/>
+          <ac:spMkLst>
+            <pc:docMk/>
+            <pc:sldMk cId="1544177429" sldId="262"/>
+            <ac:spMk id="15" creationId="{FCA23189-1D1B-4D53-95E7-6B2D3AC2DEF3}"/>
+          </ac:spMkLst>
+        </pc:spChg>
+        <pc:spChg chg="del mod">
+          <ac:chgData name="Fatima Pillosu" userId="a6295d4dc9e22643" providerId="LiveId" clId="{4141B046-8B73-4D1D-9A15-713BF63B7BF4}" dt="2021-01-22T15:18:21.900" v="54" actId="21"/>
+          <ac:spMkLst>
+            <pc:docMk/>
+            <pc:sldMk cId="1544177429" sldId="262"/>
+            <ac:spMk id="16" creationId="{88227FBA-93A5-4F8D-AF35-B816179790A1}"/>
+          </ac:spMkLst>
+        </pc:spChg>
+        <pc:spChg chg="del mod">
+          <ac:chgData name="Fatima Pillosu" userId="a6295d4dc9e22643" providerId="LiveId" clId="{4141B046-8B73-4D1D-9A15-713BF63B7BF4}" dt="2021-01-22T15:18:21.900" v="54" actId="21"/>
+          <ac:spMkLst>
+            <pc:docMk/>
+            <pc:sldMk cId="1544177429" sldId="262"/>
+            <ac:spMk id="17" creationId="{EF39643F-A024-47E7-BF13-66CD4E8FB6BB}"/>
+          </ac:spMkLst>
+        </pc:spChg>
+        <pc:spChg chg="del mod">
+          <ac:chgData name="Fatima Pillosu" userId="a6295d4dc9e22643" providerId="LiveId" clId="{4141B046-8B73-4D1D-9A15-713BF63B7BF4}" dt="2021-01-22T15:18:21.900" v="54" actId="21"/>
+          <ac:spMkLst>
+            <pc:docMk/>
+            <pc:sldMk cId="1544177429" sldId="262"/>
+            <ac:spMk id="18" creationId="{CEE2F4C8-D41E-48DF-8657-64FB651F88AE}"/>
+          </ac:spMkLst>
+        </pc:spChg>
+        <pc:spChg chg="del mod">
+          <ac:chgData name="Fatima Pillosu" userId="a6295d4dc9e22643" providerId="LiveId" clId="{4141B046-8B73-4D1D-9A15-713BF63B7BF4}" dt="2021-01-22T15:18:21.900" v="54" actId="21"/>
+          <ac:spMkLst>
+            <pc:docMk/>
+            <pc:sldMk cId="1544177429" sldId="262"/>
+            <ac:spMk id="19" creationId="{0CE99295-51E1-4F3B-97F9-621D25925B5E}"/>
+          </ac:spMkLst>
+        </pc:spChg>
+        <pc:spChg chg="del mod">
+          <ac:chgData name="Fatima Pillosu" userId="a6295d4dc9e22643" providerId="LiveId" clId="{4141B046-8B73-4D1D-9A15-713BF63B7BF4}" dt="2021-01-22T15:18:21.900" v="54" actId="21"/>
+          <ac:spMkLst>
+            <pc:docMk/>
+            <pc:sldMk cId="1544177429" sldId="262"/>
+            <ac:spMk id="21" creationId="{73B7C62C-9EBC-4F8F-AD08-4C121768BABF}"/>
+          </ac:spMkLst>
+        </pc:spChg>
+        <pc:spChg chg="add mod">
+          <ac:chgData name="Fatima Pillosu" userId="a6295d4dc9e22643" providerId="LiveId" clId="{4141B046-8B73-4D1D-9A15-713BF63B7BF4}" dt="2021-01-22T15:18:42.101" v="55"/>
+          <ac:spMkLst>
+            <pc:docMk/>
+            <pc:sldMk cId="1544177429" sldId="262"/>
+            <ac:spMk id="26" creationId="{39AC489C-A4E6-454E-B401-16958F5EC509}"/>
+          </ac:spMkLst>
+        </pc:spChg>
+        <pc:spChg chg="add mod">
+          <ac:chgData name="Fatima Pillosu" userId="a6295d4dc9e22643" providerId="LiveId" clId="{4141B046-8B73-4D1D-9A15-713BF63B7BF4}" dt="2021-01-22T15:18:42.101" v="55"/>
+          <ac:spMkLst>
+            <pc:docMk/>
+            <pc:sldMk cId="1544177429" sldId="262"/>
+            <ac:spMk id="27" creationId="{17796779-4FF0-497F-A00B-74A94824D894}"/>
+          </ac:spMkLst>
+        </pc:spChg>
+        <pc:spChg chg="add mod">
+          <ac:chgData name="Fatima Pillosu" userId="a6295d4dc9e22643" providerId="LiveId" clId="{4141B046-8B73-4D1D-9A15-713BF63B7BF4}" dt="2021-01-22T15:18:42.101" v="55"/>
+          <ac:spMkLst>
+            <pc:docMk/>
+            <pc:sldMk cId="1544177429" sldId="262"/>
+            <ac:spMk id="28" creationId="{19544C9A-A0F2-43DF-B4D9-F51CCAD846EC}"/>
+          </ac:spMkLst>
+        </pc:spChg>
+        <pc:spChg chg="add mod">
+          <ac:chgData name="Fatima Pillosu" userId="a6295d4dc9e22643" providerId="LiveId" clId="{4141B046-8B73-4D1D-9A15-713BF63B7BF4}" dt="2021-01-22T15:18:42.101" v="55"/>
+          <ac:spMkLst>
+            <pc:docMk/>
+            <pc:sldMk cId="1544177429" sldId="262"/>
+            <ac:spMk id="29" creationId="{F0A06D56-629C-4C5C-9A2D-C5377D3EC08C}"/>
+          </ac:spMkLst>
+        </pc:spChg>
+        <pc:spChg chg="add mod">
+          <ac:chgData name="Fatima Pillosu" userId="a6295d4dc9e22643" providerId="LiveId" clId="{4141B046-8B73-4D1D-9A15-713BF63B7BF4}" dt="2021-01-22T15:18:42.101" v="55"/>
+          <ac:spMkLst>
+            <pc:docMk/>
+            <pc:sldMk cId="1544177429" sldId="262"/>
+            <ac:spMk id="30" creationId="{CDBCF8F0-D304-44A6-8F91-78C01E4FF2BB}"/>
+          </ac:spMkLst>
+        </pc:spChg>
+        <pc:spChg chg="add mod">
+          <ac:chgData name="Fatima Pillosu" userId="a6295d4dc9e22643" providerId="LiveId" clId="{4141B046-8B73-4D1D-9A15-713BF63B7BF4}" dt="2021-01-22T15:18:42.101" v="55"/>
+          <ac:spMkLst>
+            <pc:docMk/>
+            <pc:sldMk cId="1544177429" sldId="262"/>
+            <ac:spMk id="31" creationId="{3E772AC3-EED8-4446-81E6-5E33D28BFCA4}"/>
+          </ac:spMkLst>
+        </pc:spChg>
+        <pc:spChg chg="add mod">
+          <ac:chgData name="Fatima Pillosu" userId="a6295d4dc9e22643" providerId="LiveId" clId="{4141B046-8B73-4D1D-9A15-713BF63B7BF4}" dt="2021-01-22T15:18:42.101" v="55"/>
+          <ac:spMkLst>
+            <pc:docMk/>
+            <pc:sldMk cId="1544177429" sldId="262"/>
+            <ac:spMk id="32" creationId="{863F6727-CF58-40B7-9A1B-C4A1B693A1BE}"/>
+          </ac:spMkLst>
+        </pc:spChg>
+        <pc:spChg chg="add mod">
+          <ac:chgData name="Fatima Pillosu" userId="a6295d4dc9e22643" providerId="LiveId" clId="{4141B046-8B73-4D1D-9A15-713BF63B7BF4}" dt="2021-01-22T15:18:42.101" v="55"/>
+          <ac:spMkLst>
+            <pc:docMk/>
+            <pc:sldMk cId="1544177429" sldId="262"/>
+            <ac:spMk id="34" creationId="{10ECE43D-05A9-4654-847C-6AC2D58F13F0}"/>
+          </ac:spMkLst>
+        </pc:spChg>
+        <pc:spChg chg="add mod">
+          <ac:chgData name="Fatima Pillosu" userId="a6295d4dc9e22643" providerId="LiveId" clId="{4141B046-8B73-4D1D-9A15-713BF63B7BF4}" dt="2021-01-22T15:18:42.101" v="55"/>
+          <ac:spMkLst>
+            <pc:docMk/>
+            <pc:sldMk cId="1544177429" sldId="262"/>
+            <ac:spMk id="35" creationId="{DBE5608E-8A3D-4993-8F3A-8A5B0110E634}"/>
+          </ac:spMkLst>
+        </pc:spChg>
+        <pc:spChg chg="add mod">
+          <ac:chgData name="Fatima Pillosu" userId="a6295d4dc9e22643" providerId="LiveId" clId="{4141B046-8B73-4D1D-9A15-713BF63B7BF4}" dt="2021-01-22T15:18:42.101" v="55"/>
+          <ac:spMkLst>
+            <pc:docMk/>
+            <pc:sldMk cId="1544177429" sldId="262"/>
+            <ac:spMk id="36" creationId="{393B2F86-5E11-417C-B41C-064C48DA7A1C}"/>
+          </ac:spMkLst>
+        </pc:spChg>
+        <pc:spChg chg="add mod">
+          <ac:chgData name="Fatima Pillosu" userId="a6295d4dc9e22643" providerId="LiveId" clId="{4141B046-8B73-4D1D-9A15-713BF63B7BF4}" dt="2021-01-22T15:18:42.101" v="55"/>
+          <ac:spMkLst>
+            <pc:docMk/>
+            <pc:sldMk cId="1544177429" sldId="262"/>
+            <ac:spMk id="37" creationId="{7F6D35CC-75E0-4C45-AD36-14EED76F50E2}"/>
+          </ac:spMkLst>
+        </pc:spChg>
+        <pc:spChg chg="add mod">
+          <ac:chgData name="Fatima Pillosu" userId="a6295d4dc9e22643" providerId="LiveId" clId="{4141B046-8B73-4D1D-9A15-713BF63B7BF4}" dt="2021-01-22T15:18:42.101" v="55"/>
+          <ac:spMkLst>
+            <pc:docMk/>
+            <pc:sldMk cId="1544177429" sldId="262"/>
+            <ac:spMk id="38" creationId="{F1A5061F-8D2B-4F88-B593-11CCBBBBB0E8}"/>
+          </ac:spMkLst>
+        </pc:spChg>
+        <pc:spChg chg="add mod">
+          <ac:chgData name="Fatima Pillosu" userId="a6295d4dc9e22643" providerId="LiveId" clId="{4141B046-8B73-4D1D-9A15-713BF63B7BF4}" dt="2021-01-22T15:18:42.101" v="55"/>
+          <ac:spMkLst>
+            <pc:docMk/>
+            <pc:sldMk cId="1544177429" sldId="262"/>
+            <ac:spMk id="39" creationId="{763AE0A3-3C07-4AB5-B516-4695BA4E9F5E}"/>
+          </ac:spMkLst>
+        </pc:spChg>
+        <pc:picChg chg="del mod">
+          <ac:chgData name="Fatima Pillosu" userId="a6295d4dc9e22643" providerId="LiveId" clId="{4141B046-8B73-4D1D-9A15-713BF63B7BF4}" dt="2021-01-22T15:18:21.900" v="54" actId="21"/>
+          <ac:picMkLst>
+            <pc:docMk/>
+            <pc:sldMk cId="1544177429" sldId="262"/>
+            <ac:picMk id="4" creationId="{6580E3A3-98EB-474C-9B23-F29E015557C6}"/>
+          </ac:picMkLst>
+        </pc:picChg>
+        <pc:picChg chg="del mod">
+          <ac:chgData name="Fatima Pillosu" userId="a6295d4dc9e22643" providerId="LiveId" clId="{4141B046-8B73-4D1D-9A15-713BF63B7BF4}" dt="2021-01-22T15:18:21.900" v="54" actId="21"/>
+          <ac:picMkLst>
+            <pc:docMk/>
+            <pc:sldMk cId="1544177429" sldId="262"/>
+            <ac:picMk id="5" creationId="{71497A23-CDB0-4ABF-AD97-4B4D06C43950}"/>
+          </ac:picMkLst>
+        </pc:picChg>
+        <pc:picChg chg="del mod">
+          <ac:chgData name="Fatima Pillosu" userId="a6295d4dc9e22643" providerId="LiveId" clId="{4141B046-8B73-4D1D-9A15-713BF63B7BF4}" dt="2021-01-22T15:18:21.900" v="54" actId="21"/>
+          <ac:picMkLst>
+            <pc:docMk/>
+            <pc:sldMk cId="1544177429" sldId="262"/>
+            <ac:picMk id="6" creationId="{783B8D77-C097-4D52-895A-863A3ECC19CE}"/>
+          </ac:picMkLst>
+        </pc:picChg>
+        <pc:picChg chg="del mod">
+          <ac:chgData name="Fatima Pillosu" userId="a6295d4dc9e22643" providerId="LiveId" clId="{4141B046-8B73-4D1D-9A15-713BF63B7BF4}" dt="2021-01-22T15:18:21.900" v="54" actId="21"/>
+          <ac:picMkLst>
+            <pc:docMk/>
+            <pc:sldMk cId="1544177429" sldId="262"/>
+            <ac:picMk id="14" creationId="{0F8D96D3-579C-4D0C-BC86-1DA1491118E9}"/>
+          </ac:picMkLst>
+        </pc:picChg>
+        <pc:picChg chg="add mod">
+          <ac:chgData name="Fatima Pillosu" userId="a6295d4dc9e22643" providerId="LiveId" clId="{4141B046-8B73-4D1D-9A15-713BF63B7BF4}" dt="2021-01-22T15:18:42.101" v="55"/>
+          <ac:picMkLst>
+            <pc:docMk/>
+            <pc:sldMk cId="1544177429" sldId="262"/>
+            <ac:picMk id="23" creationId="{FC93BB72-4250-4FF7-8C1A-3269CCFC96E7}"/>
+          </ac:picMkLst>
+        </pc:picChg>
+        <pc:picChg chg="add mod">
+          <ac:chgData name="Fatima Pillosu" userId="a6295d4dc9e22643" providerId="LiveId" clId="{4141B046-8B73-4D1D-9A15-713BF63B7BF4}" dt="2021-01-22T15:18:42.101" v="55"/>
+          <ac:picMkLst>
+            <pc:docMk/>
+            <pc:sldMk cId="1544177429" sldId="262"/>
+            <ac:picMk id="24" creationId="{C9A434EE-6A34-48FE-B0FB-E538AE4F42F7}"/>
+          </ac:picMkLst>
+        </pc:picChg>
+        <pc:picChg chg="add mod">
+          <ac:chgData name="Fatima Pillosu" userId="a6295d4dc9e22643" providerId="LiveId" clId="{4141B046-8B73-4D1D-9A15-713BF63B7BF4}" dt="2021-01-22T15:18:42.101" v="55"/>
+          <ac:picMkLst>
+            <pc:docMk/>
+            <pc:sldMk cId="1544177429" sldId="262"/>
+            <ac:picMk id="25" creationId="{6E3EB8A4-2C7D-44B9-9772-2CE2BE5DAB36}"/>
+          </ac:picMkLst>
+        </pc:picChg>
+        <pc:picChg chg="add mod">
+          <ac:chgData name="Fatima Pillosu" userId="a6295d4dc9e22643" providerId="LiveId" clId="{4141B046-8B73-4D1D-9A15-713BF63B7BF4}" dt="2021-01-22T15:18:42.101" v="55"/>
+          <ac:picMkLst>
+            <pc:docMk/>
+            <pc:sldMk cId="1544177429" sldId="262"/>
+            <ac:picMk id="33" creationId="{B3D2070A-4316-43D4-A099-63612CAACEB8}"/>
+          </ac:picMkLst>
+        </pc:picChg>
+        <pc:cxnChg chg="add del mod">
+          <ac:chgData name="Fatima Pillosu" userId="a6295d4dc9e22643" providerId="LiveId" clId="{4141B046-8B73-4D1D-9A15-713BF63B7BF4}" dt="2021-01-22T15:18:19.154" v="53" actId="478"/>
+          <ac:cxnSpMkLst>
+            <pc:docMk/>
+            <pc:sldMk cId="1544177429" sldId="262"/>
+            <ac:cxnSpMk id="3" creationId="{AF2753DC-EABB-43D5-AEFD-BD566D421137}"/>
+          </ac:cxnSpMkLst>
+        </pc:cxnChg>
+      </pc:sldChg>
       <pc:sldChg chg="del">
         <pc:chgData name="Fatima Pillosu" userId="a6295d4dc9e22643" providerId="LiveId" clId="{4141B046-8B73-4D1D-9A15-713BF63B7BF4}" dt="2020-12-03T10:10:21.288" v="1" actId="2696"/>
         <pc:sldMkLst>
@@ -2120,7 +2415,7 @@
           <a:p>
             <a:fld id="{07C00DE3-7CA2-4029-89C0-363A61D50D90}" type="datetimeFigureOut">
               <a:rPr lang="en-GB" smtClean="0"/>
-              <a:t>03/12/2020</a:t>
+              <a:t>22/01/2021</a:t>
             </a:fld>
             <a:endParaRPr lang="en-GB"/>
           </a:p>
@@ -2138,8 +2433,8 @@
         </p:nvSpPr>
         <p:spPr>
           <a:xfrm>
-            <a:off x="2217738" y="1233488"/>
-            <a:ext cx="2306637" cy="3332162"/>
+            <a:off x="1493838" y="1233488"/>
+            <a:ext cx="3754437" cy="3332162"/>
           </a:xfrm>
           <a:prstGeom prst="rect">
             <a:avLst/>
@@ -2294,8 +2589,8 @@
   </p:cSld>
   <p:clrMap bg1="lt1" tx1="dk1" bg2="lt2" tx2="dk2" accent1="accent1" accent2="accent2" accent3="accent3" accent4="accent4" accent5="accent5" accent6="accent6" hlink="hlink" folHlink="folHlink"/>
   <p:notesStyle>
-    <a:lvl1pPr marL="0" algn="l" defTabSz="914400" rtl="0" eaLnBrk="1" latinLnBrk="0" hangingPunct="1">
-      <a:defRPr sz="1200" kern="1200">
+    <a:lvl1pPr marL="0" algn="l" defTabSz="655808" rtl="0" eaLnBrk="1" latinLnBrk="0" hangingPunct="1">
+      <a:defRPr sz="861" kern="1200">
         <a:solidFill>
           <a:schemeClr val="tx1"/>
         </a:solidFill>
@@ -2304,8 +2599,8 @@
         <a:cs typeface="+mn-cs"/>
       </a:defRPr>
     </a:lvl1pPr>
-    <a:lvl2pPr marL="457200" algn="l" defTabSz="914400" rtl="0" eaLnBrk="1" latinLnBrk="0" hangingPunct="1">
-      <a:defRPr sz="1200" kern="1200">
+    <a:lvl2pPr marL="327904" algn="l" defTabSz="655808" rtl="0" eaLnBrk="1" latinLnBrk="0" hangingPunct="1">
+      <a:defRPr sz="861" kern="1200">
         <a:solidFill>
           <a:schemeClr val="tx1"/>
         </a:solidFill>
@@ -2314,8 +2609,8 @@
         <a:cs typeface="+mn-cs"/>
       </a:defRPr>
     </a:lvl2pPr>
-    <a:lvl3pPr marL="914400" algn="l" defTabSz="914400" rtl="0" eaLnBrk="1" latinLnBrk="0" hangingPunct="1">
-      <a:defRPr sz="1200" kern="1200">
+    <a:lvl3pPr marL="655808" algn="l" defTabSz="655808" rtl="0" eaLnBrk="1" latinLnBrk="0" hangingPunct="1">
+      <a:defRPr sz="861" kern="1200">
         <a:solidFill>
           <a:schemeClr val="tx1"/>
         </a:solidFill>
@@ -2324,8 +2619,8 @@
         <a:cs typeface="+mn-cs"/>
       </a:defRPr>
     </a:lvl3pPr>
-    <a:lvl4pPr marL="1371600" algn="l" defTabSz="914400" rtl="0" eaLnBrk="1" latinLnBrk="0" hangingPunct="1">
-      <a:defRPr sz="1200" kern="1200">
+    <a:lvl4pPr marL="983712" algn="l" defTabSz="655808" rtl="0" eaLnBrk="1" latinLnBrk="0" hangingPunct="1">
+      <a:defRPr sz="861" kern="1200">
         <a:solidFill>
           <a:schemeClr val="tx1"/>
         </a:solidFill>
@@ -2334,8 +2629,8 @@
         <a:cs typeface="+mn-cs"/>
       </a:defRPr>
     </a:lvl4pPr>
-    <a:lvl5pPr marL="1828800" algn="l" defTabSz="914400" rtl="0" eaLnBrk="1" latinLnBrk="0" hangingPunct="1">
-      <a:defRPr sz="1200" kern="1200">
+    <a:lvl5pPr marL="1311615" algn="l" defTabSz="655808" rtl="0" eaLnBrk="1" latinLnBrk="0" hangingPunct="1">
+      <a:defRPr sz="861" kern="1200">
         <a:solidFill>
           <a:schemeClr val="tx1"/>
         </a:solidFill>
@@ -2344,8 +2639,8 @@
         <a:cs typeface="+mn-cs"/>
       </a:defRPr>
     </a:lvl5pPr>
-    <a:lvl6pPr marL="2286000" algn="l" defTabSz="914400" rtl="0" eaLnBrk="1" latinLnBrk="0" hangingPunct="1">
-      <a:defRPr sz="1200" kern="1200">
+    <a:lvl6pPr marL="1639519" algn="l" defTabSz="655808" rtl="0" eaLnBrk="1" latinLnBrk="0" hangingPunct="1">
+      <a:defRPr sz="861" kern="1200">
         <a:solidFill>
           <a:schemeClr val="tx1"/>
         </a:solidFill>
@@ -2354,8 +2649,8 @@
         <a:cs typeface="+mn-cs"/>
       </a:defRPr>
     </a:lvl6pPr>
-    <a:lvl7pPr marL="2743200" algn="l" defTabSz="914400" rtl="0" eaLnBrk="1" latinLnBrk="0" hangingPunct="1">
-      <a:defRPr sz="1200" kern="1200">
+    <a:lvl7pPr marL="1967423" algn="l" defTabSz="655808" rtl="0" eaLnBrk="1" latinLnBrk="0" hangingPunct="1">
+      <a:defRPr sz="861" kern="1200">
         <a:solidFill>
           <a:schemeClr val="tx1"/>
         </a:solidFill>
@@ -2364,8 +2659,8 @@
         <a:cs typeface="+mn-cs"/>
       </a:defRPr>
     </a:lvl7pPr>
-    <a:lvl8pPr marL="3200400" algn="l" defTabSz="914400" rtl="0" eaLnBrk="1" latinLnBrk="0" hangingPunct="1">
-      <a:defRPr sz="1200" kern="1200">
+    <a:lvl8pPr marL="2295327" algn="l" defTabSz="655808" rtl="0" eaLnBrk="1" latinLnBrk="0" hangingPunct="1">
+      <a:defRPr sz="861" kern="1200">
         <a:solidFill>
           <a:schemeClr val="tx1"/>
         </a:solidFill>
@@ -2374,8 +2669,8 @@
         <a:cs typeface="+mn-cs"/>
       </a:defRPr>
     </a:lvl8pPr>
-    <a:lvl9pPr marL="3657600" algn="l" defTabSz="914400" rtl="0" eaLnBrk="1" latinLnBrk="0" hangingPunct="1">
-      <a:defRPr sz="1200" kern="1200">
+    <a:lvl9pPr marL="2623231" algn="l" defTabSz="655808" rtl="0" eaLnBrk="1" latinLnBrk="0" hangingPunct="1">
+      <a:defRPr sz="861" kern="1200">
         <a:solidFill>
           <a:schemeClr val="tx1"/>
         </a:solidFill>
@@ -2390,7 +2685,7 @@
 
 <file path=ppt/slideLayouts/slideLayout1.xml><?xml version="1.0" encoding="utf-8"?>
 <p:sldLayout xmlns:a="http://schemas.openxmlformats.org/drawingml/2006/main" xmlns:r="http://schemas.openxmlformats.org/officeDocument/2006/relationships" xmlns:p="http://schemas.openxmlformats.org/presentationml/2006/main" type="title" preserve="1">
-  <p:cSld name="Diapositiva titolo">
+  <p:cSld name="Title Slide">
     <p:spTree>
       <p:nvGrpSpPr>
         <p:cNvPr id="1" name=""/>
@@ -2417,21 +2712,21 @@
         </p:nvSpPr>
         <p:spPr>
           <a:xfrm>
-            <a:off x="514350" y="1621191"/>
-            <a:ext cx="5829300" cy="3448756"/>
+            <a:off x="477917" y="924910"/>
+            <a:ext cx="5416391" cy="1967559"/>
           </a:xfrm>
         </p:spPr>
         <p:txBody>
           <a:bodyPr anchor="b"/>
           <a:lstStyle>
             <a:lvl1pPr algn="ctr">
-              <a:defRPr sz="4500"/>
+              <a:defRPr sz="4181"/>
             </a:lvl1pPr>
           </a:lstStyle>
           <a:p>
             <a:r>
-              <a:rPr lang="it-IT"/>
-              <a:t>Fare clic per modificare lo stile del titolo dello schema</a:t>
+              <a:rPr lang="en-US"/>
+              <a:t>Click to edit Master title style</a:t>
             </a:r>
             <a:endParaRPr lang="en-US" dirty="0"/>
           </a:p>
@@ -2449,8 +2744,8 @@
         </p:nvSpPr>
         <p:spPr>
           <a:xfrm>
-            <a:off x="857250" y="5202944"/>
-            <a:ext cx="5143500" cy="2391656"/>
+            <a:off x="796528" y="2968346"/>
+            <a:ext cx="4779169" cy="1364471"/>
           </a:xfrm>
         </p:spPr>
         <p:txBody>
@@ -2458,45 +2753,45 @@
           <a:lstStyle>
             <a:lvl1pPr marL="0" indent="0" algn="ctr">
               <a:buNone/>
-              <a:defRPr sz="1800"/>
+              <a:defRPr sz="1673"/>
             </a:lvl1pPr>
-            <a:lvl2pPr marL="342900" indent="0" algn="ctr">
+            <a:lvl2pPr marL="318623" indent="0" algn="ctr">
               <a:buNone/>
-              <a:defRPr sz="1500"/>
+              <a:defRPr sz="1394"/>
             </a:lvl2pPr>
-            <a:lvl3pPr marL="685800" indent="0" algn="ctr">
+            <a:lvl3pPr marL="637245" indent="0" algn="ctr">
               <a:buNone/>
-              <a:defRPr sz="1350"/>
+              <a:defRPr sz="1254"/>
             </a:lvl3pPr>
-            <a:lvl4pPr marL="1028700" indent="0" algn="ctr">
+            <a:lvl4pPr marL="955868" indent="0" algn="ctr">
               <a:buNone/>
-              <a:defRPr sz="1200"/>
+              <a:defRPr sz="1115"/>
             </a:lvl4pPr>
-            <a:lvl5pPr marL="1371600" indent="0" algn="ctr">
+            <a:lvl5pPr marL="1274491" indent="0" algn="ctr">
               <a:buNone/>
-              <a:defRPr sz="1200"/>
+              <a:defRPr sz="1115"/>
             </a:lvl5pPr>
-            <a:lvl6pPr marL="1714500" indent="0" algn="ctr">
+            <a:lvl6pPr marL="1593113" indent="0" algn="ctr">
               <a:buNone/>
-              <a:defRPr sz="1200"/>
+              <a:defRPr sz="1115"/>
             </a:lvl6pPr>
-            <a:lvl7pPr marL="2057400" indent="0" algn="ctr">
+            <a:lvl7pPr marL="1911736" indent="0" algn="ctr">
               <a:buNone/>
-              <a:defRPr sz="1200"/>
+              <a:defRPr sz="1115"/>
             </a:lvl7pPr>
-            <a:lvl8pPr marL="2400300" indent="0" algn="ctr">
+            <a:lvl8pPr marL="2230359" indent="0" algn="ctr">
               <a:buNone/>
-              <a:defRPr sz="1200"/>
+              <a:defRPr sz="1115"/>
             </a:lvl8pPr>
-            <a:lvl9pPr marL="2743200" indent="0" algn="ctr">
+            <a:lvl9pPr marL="2548981" indent="0" algn="ctr">
               <a:buNone/>
-              <a:defRPr sz="1200"/>
+              <a:defRPr sz="1115"/>
             </a:lvl9pPr>
           </a:lstStyle>
           <a:p>
             <a:r>
-              <a:rPr lang="it-IT"/>
-              <a:t>Fare clic per modificare lo stile del sottotitolo dello schema</a:t>
+              <a:rPr lang="en-US"/>
+              <a:t>Click to edit Master subtitle style</a:t>
             </a:r>
             <a:endParaRPr lang="en-US" dirty="0"/>
           </a:p>
@@ -2519,7 +2814,7 @@
           <a:p>
             <a:fld id="{162587DE-05E3-4A7B-A434-975C0FFAAAE7}" type="datetimeFigureOut">
               <a:rPr lang="en-GB" smtClean="0"/>
-              <a:t>03/12/2020</a:t>
+              <a:t>22/01/2021</a:t>
             </a:fld>
             <a:endParaRPr lang="en-GB"/>
           </a:p>
@@ -2570,7 +2865,7 @@
     </p:spTree>
     <p:extLst>
       <p:ext uri="{BB962C8B-B14F-4D97-AF65-F5344CB8AC3E}">
-        <p14:creationId xmlns:p14="http://schemas.microsoft.com/office/powerpoint/2010/main" val="2569694227"/>
+        <p14:creationId xmlns:p14="http://schemas.microsoft.com/office/powerpoint/2010/main" val="1133736092"/>
       </p:ext>
     </p:extLst>
   </p:cSld>
@@ -2582,7 +2877,7 @@
 
 <file path=ppt/slideLayouts/slideLayout10.xml><?xml version="1.0" encoding="utf-8"?>
 <p:sldLayout xmlns:a="http://schemas.openxmlformats.org/drawingml/2006/main" xmlns:r="http://schemas.openxmlformats.org/officeDocument/2006/relationships" xmlns:p="http://schemas.openxmlformats.org/presentationml/2006/main" type="vertTx" preserve="1">
-  <p:cSld name="Titolo e testo verticale">
+  <p:cSld name="Title and Vertical Text">
     <p:spTree>
       <p:nvGrpSpPr>
         <p:cNvPr id="1" name=""/>
@@ -2613,8 +2908,8 @@
           <a:lstStyle/>
           <a:p>
             <a:r>
-              <a:rPr lang="it-IT"/>
-              <a:t>Fare clic per modificare lo stile del titolo dello schema</a:t>
+              <a:rPr lang="en-US"/>
+              <a:t>Click to edit Master title style</a:t>
             </a:r>
             <a:endParaRPr lang="en-US" dirty="0"/>
           </a:p>
@@ -2637,36 +2932,36 @@
           <a:p>
             <a:pPr lvl="0"/>
             <a:r>
-              <a:rPr lang="it-IT"/>
-              <a:t>Fare clic per modificare gli stili del testo dello schema</a:t>
+              <a:rPr lang="en-US"/>
+              <a:t>Click to edit Master text styles</a:t>
             </a:r>
           </a:p>
           <a:p>
             <a:pPr lvl="1"/>
             <a:r>
-              <a:rPr lang="it-IT"/>
-              <a:t>Secondo livello</a:t>
+              <a:rPr lang="en-US"/>
+              <a:t>Second level</a:t>
             </a:r>
           </a:p>
           <a:p>
             <a:pPr lvl="2"/>
             <a:r>
-              <a:rPr lang="it-IT"/>
-              <a:t>Terzo livello</a:t>
+              <a:rPr lang="en-US"/>
+              <a:t>Third level</a:t>
             </a:r>
           </a:p>
           <a:p>
             <a:pPr lvl="3"/>
             <a:r>
-              <a:rPr lang="it-IT"/>
-              <a:t>Quarto livello</a:t>
+              <a:rPr lang="en-US"/>
+              <a:t>Fourth level</a:t>
             </a:r>
           </a:p>
           <a:p>
             <a:pPr lvl="4"/>
             <a:r>
-              <a:rPr lang="it-IT"/>
-              <a:t>Quinto livello</a:t>
+              <a:rPr lang="en-US"/>
+              <a:t>Fifth level</a:t>
             </a:r>
             <a:endParaRPr lang="en-US" dirty="0"/>
           </a:p>
@@ -2689,7 +2984,7 @@
           <a:p>
             <a:fld id="{162587DE-05E3-4A7B-A434-975C0FFAAAE7}" type="datetimeFigureOut">
               <a:rPr lang="en-GB" smtClean="0"/>
-              <a:t>03/12/2020</a:t>
+              <a:t>22/01/2021</a:t>
             </a:fld>
             <a:endParaRPr lang="en-GB"/>
           </a:p>
@@ -2740,7 +3035,7 @@
     </p:spTree>
     <p:extLst>
       <p:ext uri="{BB962C8B-B14F-4D97-AF65-F5344CB8AC3E}">
-        <p14:creationId xmlns:p14="http://schemas.microsoft.com/office/powerpoint/2010/main" val="3125453763"/>
+        <p14:creationId xmlns:p14="http://schemas.microsoft.com/office/powerpoint/2010/main" val="2156811417"/>
       </p:ext>
     </p:extLst>
   </p:cSld>
@@ -2752,7 +3047,7 @@
 
 <file path=ppt/slideLayouts/slideLayout11.xml><?xml version="1.0" encoding="utf-8"?>
 <p:sldLayout xmlns:a="http://schemas.openxmlformats.org/drawingml/2006/main" xmlns:r="http://schemas.openxmlformats.org/officeDocument/2006/relationships" xmlns:p="http://schemas.openxmlformats.org/presentationml/2006/main" type="vertTitleAndTx" preserve="1">
-  <p:cSld name="1_Titolo e testo verticale">
+  <p:cSld name="Vertical Title and Text">
     <p:spTree>
       <p:nvGrpSpPr>
         <p:cNvPr id="1" name=""/>
@@ -2779,8 +3074,8 @@
         </p:nvSpPr>
         <p:spPr>
           <a:xfrm>
-            <a:off x="4907757" y="527403"/>
-            <a:ext cx="1478756" cy="8394877"/>
+            <a:off x="4560124" y="300890"/>
+            <a:ext cx="1374011" cy="4789385"/>
           </a:xfrm>
         </p:spPr>
         <p:txBody>
@@ -2788,8 +3083,8 @@
           <a:lstStyle/>
           <a:p>
             <a:r>
-              <a:rPr lang="it-IT"/>
-              <a:t>Fare clic per modificare lo stile del titolo dello schema</a:t>
+              <a:rPr lang="en-US"/>
+              <a:t>Click to edit Master title style</a:t>
             </a:r>
             <a:endParaRPr lang="en-US" dirty="0"/>
           </a:p>
@@ -2807,8 +3102,8 @@
         </p:nvSpPr>
         <p:spPr>
           <a:xfrm>
-            <a:off x="471488" y="527403"/>
-            <a:ext cx="4350544" cy="8394877"/>
+            <a:off x="438091" y="300890"/>
+            <a:ext cx="4042380" cy="4789385"/>
           </a:xfrm>
         </p:spPr>
         <p:txBody>
@@ -2817,36 +3112,36 @@
           <a:p>
             <a:pPr lvl="0"/>
             <a:r>
-              <a:rPr lang="it-IT"/>
-              <a:t>Fare clic per modificare gli stili del testo dello schema</a:t>
+              <a:rPr lang="en-US"/>
+              <a:t>Click to edit Master text styles</a:t>
             </a:r>
           </a:p>
           <a:p>
             <a:pPr lvl="1"/>
             <a:r>
-              <a:rPr lang="it-IT"/>
-              <a:t>Secondo livello</a:t>
+              <a:rPr lang="en-US"/>
+              <a:t>Second level</a:t>
             </a:r>
           </a:p>
           <a:p>
             <a:pPr lvl="2"/>
             <a:r>
-              <a:rPr lang="it-IT"/>
-              <a:t>Terzo livello</a:t>
+              <a:rPr lang="en-US"/>
+              <a:t>Third level</a:t>
             </a:r>
           </a:p>
           <a:p>
             <a:pPr lvl="3"/>
             <a:r>
-              <a:rPr lang="it-IT"/>
-              <a:t>Quarto livello</a:t>
+              <a:rPr lang="en-US"/>
+              <a:t>Fourth level</a:t>
             </a:r>
           </a:p>
           <a:p>
             <a:pPr lvl="4"/>
             <a:r>
-              <a:rPr lang="it-IT"/>
-              <a:t>Quinto livello</a:t>
+              <a:rPr lang="en-US"/>
+              <a:t>Fifth level</a:t>
             </a:r>
             <a:endParaRPr lang="en-US" dirty="0"/>
           </a:p>
@@ -2869,7 +3164,7 @@
           <a:p>
             <a:fld id="{162587DE-05E3-4A7B-A434-975C0FFAAAE7}" type="datetimeFigureOut">
               <a:rPr lang="en-GB" smtClean="0"/>
-              <a:t>03/12/2020</a:t>
+              <a:t>22/01/2021</a:t>
             </a:fld>
             <a:endParaRPr lang="en-GB"/>
           </a:p>
@@ -2920,7 +3215,7 @@
     </p:spTree>
     <p:extLst>
       <p:ext uri="{BB962C8B-B14F-4D97-AF65-F5344CB8AC3E}">
-        <p14:creationId xmlns:p14="http://schemas.microsoft.com/office/powerpoint/2010/main" val="314834581"/>
+        <p14:creationId xmlns:p14="http://schemas.microsoft.com/office/powerpoint/2010/main" val="1325931378"/>
       </p:ext>
     </p:extLst>
   </p:cSld>
@@ -2932,7 +3227,7 @@
 
 <file path=ppt/slideLayouts/slideLayout2.xml><?xml version="1.0" encoding="utf-8"?>
 <p:sldLayout xmlns:a="http://schemas.openxmlformats.org/drawingml/2006/main" xmlns:r="http://schemas.openxmlformats.org/officeDocument/2006/relationships" xmlns:p="http://schemas.openxmlformats.org/presentationml/2006/main" type="obj" preserve="1">
-  <p:cSld name="Titolo e contenuto">
+  <p:cSld name="Title and Content">
     <p:spTree>
       <p:nvGrpSpPr>
         <p:cNvPr id="1" name=""/>
@@ -2963,8 +3258,8 @@
           <a:lstStyle/>
           <a:p>
             <a:r>
-              <a:rPr lang="it-IT"/>
-              <a:t>Fare clic per modificare lo stile del titolo dello schema</a:t>
+              <a:rPr lang="en-US"/>
+              <a:t>Click to edit Master title style</a:t>
             </a:r>
             <a:endParaRPr lang="en-US" dirty="0"/>
           </a:p>
@@ -2987,36 +3282,36 @@
           <a:p>
             <a:pPr lvl="0"/>
             <a:r>
-              <a:rPr lang="it-IT"/>
-              <a:t>Fare clic per modificare gli stili del testo dello schema</a:t>
+              <a:rPr lang="en-US"/>
+              <a:t>Click to edit Master text styles</a:t>
             </a:r>
           </a:p>
           <a:p>
             <a:pPr lvl="1"/>
             <a:r>
-              <a:rPr lang="it-IT"/>
-              <a:t>Secondo livello</a:t>
+              <a:rPr lang="en-US"/>
+              <a:t>Second level</a:t>
             </a:r>
           </a:p>
           <a:p>
             <a:pPr lvl="2"/>
             <a:r>
-              <a:rPr lang="it-IT"/>
-              <a:t>Terzo livello</a:t>
+              <a:rPr lang="en-US"/>
+              <a:t>Third level</a:t>
             </a:r>
           </a:p>
           <a:p>
             <a:pPr lvl="3"/>
             <a:r>
-              <a:rPr lang="it-IT"/>
-              <a:t>Quarto livello</a:t>
+              <a:rPr lang="en-US"/>
+              <a:t>Fourth level</a:t>
             </a:r>
           </a:p>
           <a:p>
             <a:pPr lvl="4"/>
             <a:r>
-              <a:rPr lang="it-IT"/>
-              <a:t>Quinto livello</a:t>
+              <a:rPr lang="en-US"/>
+              <a:t>Fifth level</a:t>
             </a:r>
             <a:endParaRPr lang="en-US" dirty="0"/>
           </a:p>
@@ -3039,7 +3334,7 @@
           <a:p>
             <a:fld id="{162587DE-05E3-4A7B-A434-975C0FFAAAE7}" type="datetimeFigureOut">
               <a:rPr lang="en-GB" smtClean="0"/>
-              <a:t>03/12/2020</a:t>
+              <a:t>22/01/2021</a:t>
             </a:fld>
             <a:endParaRPr lang="en-GB"/>
           </a:p>
@@ -3090,7 +3385,7 @@
     </p:spTree>
     <p:extLst>
       <p:ext uri="{BB962C8B-B14F-4D97-AF65-F5344CB8AC3E}">
-        <p14:creationId xmlns:p14="http://schemas.microsoft.com/office/powerpoint/2010/main" val="84353264"/>
+        <p14:creationId xmlns:p14="http://schemas.microsoft.com/office/powerpoint/2010/main" val="3007366000"/>
       </p:ext>
     </p:extLst>
   </p:cSld>
@@ -3102,7 +3397,7 @@
 
 <file path=ppt/slideLayouts/slideLayout3.xml><?xml version="1.0" encoding="utf-8"?>
 <p:sldLayout xmlns:a="http://schemas.openxmlformats.org/drawingml/2006/main" xmlns:r="http://schemas.openxmlformats.org/officeDocument/2006/relationships" xmlns:p="http://schemas.openxmlformats.org/presentationml/2006/main" type="secHead" preserve="1">
-  <p:cSld name="Intestazione sezione">
+  <p:cSld name="Section Header">
     <p:spTree>
       <p:nvGrpSpPr>
         <p:cNvPr id="1" name=""/>
@@ -3129,21 +3424,21 @@
         </p:nvSpPr>
         <p:spPr>
           <a:xfrm>
-            <a:off x="467916" y="2469624"/>
-            <a:ext cx="5915025" cy="4120620"/>
+            <a:off x="434772" y="1408952"/>
+            <a:ext cx="5496044" cy="2350867"/>
           </a:xfrm>
         </p:spPr>
         <p:txBody>
           <a:bodyPr anchor="b"/>
           <a:lstStyle>
             <a:lvl1pPr>
-              <a:defRPr sz="4500"/>
+              <a:defRPr sz="4181"/>
             </a:lvl1pPr>
           </a:lstStyle>
           <a:p>
             <a:r>
-              <a:rPr lang="it-IT"/>
-              <a:t>Fare clic per modificare lo stile del titolo dello schema</a:t>
+              <a:rPr lang="en-US"/>
+              <a:t>Click to edit Master title style</a:t>
             </a:r>
             <a:endParaRPr lang="en-US" dirty="0"/>
           </a:p>
@@ -3161,8 +3456,8 @@
         </p:nvSpPr>
         <p:spPr>
           <a:xfrm>
-            <a:off x="467916" y="6629226"/>
-            <a:ext cx="5915025" cy="2166937"/>
+            <a:off x="434772" y="3782059"/>
+            <a:ext cx="5496044" cy="1236265"/>
           </a:xfrm>
         </p:spPr>
         <p:txBody>
@@ -3170,15 +3465,15 @@
           <a:lstStyle>
             <a:lvl1pPr marL="0" indent="0">
               <a:buNone/>
-              <a:defRPr sz="1800">
+              <a:defRPr sz="1673">
                 <a:solidFill>
                   <a:schemeClr val="tx1"/>
                 </a:solidFill>
               </a:defRPr>
             </a:lvl1pPr>
-            <a:lvl2pPr marL="342900" indent="0">
+            <a:lvl2pPr marL="318623" indent="0">
               <a:buNone/>
-              <a:defRPr sz="1500">
+              <a:defRPr sz="1394">
                 <a:solidFill>
                   <a:schemeClr val="tx1">
                     <a:tint val="75000"/>
@@ -3186,9 +3481,9 @@
                 </a:solidFill>
               </a:defRPr>
             </a:lvl2pPr>
-            <a:lvl3pPr marL="685800" indent="0">
+            <a:lvl3pPr marL="637245" indent="0">
               <a:buNone/>
-              <a:defRPr sz="1350">
+              <a:defRPr sz="1254">
                 <a:solidFill>
                   <a:schemeClr val="tx1">
                     <a:tint val="75000"/>
@@ -3196,9 +3491,9 @@
                 </a:solidFill>
               </a:defRPr>
             </a:lvl3pPr>
-            <a:lvl4pPr marL="1028700" indent="0">
+            <a:lvl4pPr marL="955868" indent="0">
               <a:buNone/>
-              <a:defRPr sz="1200">
+              <a:defRPr sz="1115">
                 <a:solidFill>
                   <a:schemeClr val="tx1">
                     <a:tint val="75000"/>
@@ -3206,9 +3501,9 @@
                 </a:solidFill>
               </a:defRPr>
             </a:lvl4pPr>
-            <a:lvl5pPr marL="1371600" indent="0">
+            <a:lvl5pPr marL="1274491" indent="0">
               <a:buNone/>
-              <a:defRPr sz="1200">
+              <a:defRPr sz="1115">
                 <a:solidFill>
                   <a:schemeClr val="tx1">
                     <a:tint val="75000"/>
@@ -3216,9 +3511,9 @@
                 </a:solidFill>
               </a:defRPr>
             </a:lvl5pPr>
-            <a:lvl6pPr marL="1714500" indent="0">
+            <a:lvl6pPr marL="1593113" indent="0">
               <a:buNone/>
-              <a:defRPr sz="1200">
+              <a:defRPr sz="1115">
                 <a:solidFill>
                   <a:schemeClr val="tx1">
                     <a:tint val="75000"/>
@@ -3226,9 +3521,9 @@
                 </a:solidFill>
               </a:defRPr>
             </a:lvl6pPr>
-            <a:lvl7pPr marL="2057400" indent="0">
+            <a:lvl7pPr marL="1911736" indent="0">
               <a:buNone/>
-              <a:defRPr sz="1200">
+              <a:defRPr sz="1115">
                 <a:solidFill>
                   <a:schemeClr val="tx1">
                     <a:tint val="75000"/>
@@ -3236,9 +3531,9 @@
                 </a:solidFill>
               </a:defRPr>
             </a:lvl7pPr>
-            <a:lvl8pPr marL="2400300" indent="0">
+            <a:lvl8pPr marL="2230359" indent="0">
               <a:buNone/>
-              <a:defRPr sz="1200">
+              <a:defRPr sz="1115">
                 <a:solidFill>
                   <a:schemeClr val="tx1">
                     <a:tint val="75000"/>
@@ -3246,9 +3541,9 @@
                 </a:solidFill>
               </a:defRPr>
             </a:lvl8pPr>
-            <a:lvl9pPr marL="2743200" indent="0">
+            <a:lvl9pPr marL="2548981" indent="0">
               <a:buNone/>
-              <a:defRPr sz="1200">
+              <a:defRPr sz="1115">
                 <a:solidFill>
                   <a:schemeClr val="tx1">
                     <a:tint val="75000"/>
@@ -3260,8 +3555,8 @@
           <a:p>
             <a:pPr lvl="0"/>
             <a:r>
-              <a:rPr lang="it-IT"/>
-              <a:t>Fare clic per modificare gli stili del testo dello schema</a:t>
+              <a:rPr lang="en-US"/>
+              <a:t>Click to edit Master text styles</a:t>
             </a:r>
           </a:p>
         </p:txBody>
@@ -3283,7 +3578,7 @@
           <a:p>
             <a:fld id="{162587DE-05E3-4A7B-A434-975C0FFAAAE7}" type="datetimeFigureOut">
               <a:rPr lang="en-GB" smtClean="0"/>
-              <a:t>03/12/2020</a:t>
+              <a:t>22/01/2021</a:t>
             </a:fld>
             <a:endParaRPr lang="en-GB"/>
           </a:p>
@@ -3334,7 +3629,7 @@
     </p:spTree>
     <p:extLst>
       <p:ext uri="{BB962C8B-B14F-4D97-AF65-F5344CB8AC3E}">
-        <p14:creationId xmlns:p14="http://schemas.microsoft.com/office/powerpoint/2010/main" val="1640517606"/>
+        <p14:creationId xmlns:p14="http://schemas.microsoft.com/office/powerpoint/2010/main" val="1394376972"/>
       </p:ext>
     </p:extLst>
   </p:cSld>
@@ -3346,7 +3641,7 @@
 
 <file path=ppt/slideLayouts/slideLayout4.xml><?xml version="1.0" encoding="utf-8"?>
 <p:sldLayout xmlns:a="http://schemas.openxmlformats.org/drawingml/2006/main" xmlns:r="http://schemas.openxmlformats.org/officeDocument/2006/relationships" xmlns:p="http://schemas.openxmlformats.org/presentationml/2006/main" type="twoObj" preserve="1">
-  <p:cSld name="Due contenuti">
+  <p:cSld name="Two Content">
     <p:spTree>
       <p:nvGrpSpPr>
         <p:cNvPr id="1" name=""/>
@@ -3377,8 +3672,8 @@
           <a:lstStyle/>
           <a:p>
             <a:r>
-              <a:rPr lang="it-IT"/>
-              <a:t>Fare clic per modificare lo stile del titolo dello schema</a:t>
+              <a:rPr lang="en-US"/>
+              <a:t>Click to edit Master title style</a:t>
             </a:r>
             <a:endParaRPr lang="en-US" dirty="0"/>
           </a:p>
@@ -3396,8 +3691,8 @@
         </p:nvSpPr>
         <p:spPr>
           <a:xfrm>
-            <a:off x="471488" y="2637014"/>
-            <a:ext cx="2914650" cy="6285266"/>
+            <a:off x="438090" y="1504450"/>
+            <a:ext cx="2708196" cy="3585825"/>
           </a:xfrm>
         </p:spPr>
         <p:txBody>
@@ -3406,36 +3701,36 @@
           <a:p>
             <a:pPr lvl="0"/>
             <a:r>
-              <a:rPr lang="it-IT"/>
-              <a:t>Fare clic per modificare gli stili del testo dello schema</a:t>
+              <a:rPr lang="en-US"/>
+              <a:t>Click to edit Master text styles</a:t>
             </a:r>
           </a:p>
           <a:p>
             <a:pPr lvl="1"/>
             <a:r>
-              <a:rPr lang="it-IT"/>
-              <a:t>Secondo livello</a:t>
+              <a:rPr lang="en-US"/>
+              <a:t>Second level</a:t>
             </a:r>
           </a:p>
           <a:p>
             <a:pPr lvl="2"/>
             <a:r>
-              <a:rPr lang="it-IT"/>
-              <a:t>Terzo livello</a:t>
+              <a:rPr lang="en-US"/>
+              <a:t>Third level</a:t>
             </a:r>
           </a:p>
           <a:p>
             <a:pPr lvl="3"/>
             <a:r>
-              <a:rPr lang="it-IT"/>
-              <a:t>Quarto livello</a:t>
+              <a:rPr lang="en-US"/>
+              <a:t>Fourth level</a:t>
             </a:r>
           </a:p>
           <a:p>
             <a:pPr lvl="4"/>
             <a:r>
-              <a:rPr lang="it-IT"/>
-              <a:t>Quinto livello</a:t>
+              <a:rPr lang="en-US"/>
+              <a:t>Fifth level</a:t>
             </a:r>
             <a:endParaRPr lang="en-US" dirty="0"/>
           </a:p>
@@ -3453,8 +3748,8 @@
         </p:nvSpPr>
         <p:spPr>
           <a:xfrm>
-            <a:off x="3471863" y="2637014"/>
-            <a:ext cx="2914650" cy="6285266"/>
+            <a:off x="3225939" y="1504450"/>
+            <a:ext cx="2708196" cy="3585825"/>
           </a:xfrm>
         </p:spPr>
         <p:txBody>
@@ -3463,36 +3758,36 @@
           <a:p>
             <a:pPr lvl="0"/>
             <a:r>
-              <a:rPr lang="it-IT"/>
-              <a:t>Fare clic per modificare gli stili del testo dello schema</a:t>
+              <a:rPr lang="en-US"/>
+              <a:t>Click to edit Master text styles</a:t>
             </a:r>
           </a:p>
           <a:p>
             <a:pPr lvl="1"/>
             <a:r>
-              <a:rPr lang="it-IT"/>
-              <a:t>Secondo livello</a:t>
+              <a:rPr lang="en-US"/>
+              <a:t>Second level</a:t>
             </a:r>
           </a:p>
           <a:p>
             <a:pPr lvl="2"/>
             <a:r>
-              <a:rPr lang="it-IT"/>
-              <a:t>Terzo livello</a:t>
+              <a:rPr lang="en-US"/>
+              <a:t>Third level</a:t>
             </a:r>
           </a:p>
           <a:p>
             <a:pPr lvl="3"/>
             <a:r>
-              <a:rPr lang="it-IT"/>
-              <a:t>Quarto livello</a:t>
+              <a:rPr lang="en-US"/>
+              <a:t>Fourth level</a:t>
             </a:r>
           </a:p>
           <a:p>
             <a:pPr lvl="4"/>
             <a:r>
-              <a:rPr lang="it-IT"/>
-              <a:t>Quinto livello</a:t>
+              <a:rPr lang="en-US"/>
+              <a:t>Fifth level</a:t>
             </a:r>
             <a:endParaRPr lang="en-US" dirty="0"/>
           </a:p>
@@ -3515,7 +3810,7 @@
           <a:p>
             <a:fld id="{162587DE-05E3-4A7B-A434-975C0FFAAAE7}" type="datetimeFigureOut">
               <a:rPr lang="en-GB" smtClean="0"/>
-              <a:t>03/12/2020</a:t>
+              <a:t>22/01/2021</a:t>
             </a:fld>
             <a:endParaRPr lang="en-GB"/>
           </a:p>
@@ -3566,7 +3861,7 @@
     </p:spTree>
     <p:extLst>
       <p:ext uri="{BB962C8B-B14F-4D97-AF65-F5344CB8AC3E}">
-        <p14:creationId xmlns:p14="http://schemas.microsoft.com/office/powerpoint/2010/main" val="2124412929"/>
+        <p14:creationId xmlns:p14="http://schemas.microsoft.com/office/powerpoint/2010/main" val="2278590578"/>
       </p:ext>
     </p:extLst>
   </p:cSld>
@@ -3578,7 +3873,7 @@
 
 <file path=ppt/slideLayouts/slideLayout5.xml><?xml version="1.0" encoding="utf-8"?>
 <p:sldLayout xmlns:a="http://schemas.openxmlformats.org/drawingml/2006/main" xmlns:r="http://schemas.openxmlformats.org/officeDocument/2006/relationships" xmlns:p="http://schemas.openxmlformats.org/presentationml/2006/main" type="twoTxTwoObj" preserve="1">
-  <p:cSld name="Confronto">
+  <p:cSld name="Comparison">
     <p:spTree>
       <p:nvGrpSpPr>
         <p:cNvPr id="1" name=""/>
@@ -3605,8 +3900,8 @@
         </p:nvSpPr>
         <p:spPr>
           <a:xfrm>
-            <a:off x="472381" y="527405"/>
-            <a:ext cx="5915025" cy="1914702"/>
+            <a:off x="438920" y="300891"/>
+            <a:ext cx="5496044" cy="1092362"/>
           </a:xfrm>
         </p:spPr>
         <p:txBody>
@@ -3614,8 +3909,8 @@
           <a:lstStyle/>
           <a:p>
             <a:r>
-              <a:rPr lang="it-IT"/>
-              <a:t>Fare clic per modificare lo stile del titolo dello schema</a:t>
+              <a:rPr lang="en-US"/>
+              <a:t>Click to edit Master title style</a:t>
             </a:r>
             <a:endParaRPr lang="en-US" dirty="0"/>
           </a:p>
@@ -3633,8 +3928,8 @@
         </p:nvSpPr>
         <p:spPr>
           <a:xfrm>
-            <a:off x="472381" y="2428347"/>
-            <a:ext cx="2901255" cy="1190095"/>
+            <a:off x="438921" y="1385403"/>
+            <a:ext cx="2695749" cy="678965"/>
           </a:xfrm>
         </p:spPr>
         <p:txBody>
@@ -3642,46 +3937,46 @@
           <a:lstStyle>
             <a:lvl1pPr marL="0" indent="0">
               <a:buNone/>
-              <a:defRPr sz="1800" b="1"/>
+              <a:defRPr sz="1673" b="1"/>
             </a:lvl1pPr>
-            <a:lvl2pPr marL="342900" indent="0">
+            <a:lvl2pPr marL="318623" indent="0">
               <a:buNone/>
-              <a:defRPr sz="1500" b="1"/>
+              <a:defRPr sz="1394" b="1"/>
             </a:lvl2pPr>
-            <a:lvl3pPr marL="685800" indent="0">
+            <a:lvl3pPr marL="637245" indent="0">
               <a:buNone/>
-              <a:defRPr sz="1350" b="1"/>
+              <a:defRPr sz="1254" b="1"/>
             </a:lvl3pPr>
-            <a:lvl4pPr marL="1028700" indent="0">
+            <a:lvl4pPr marL="955868" indent="0">
               <a:buNone/>
-              <a:defRPr sz="1200" b="1"/>
+              <a:defRPr sz="1115" b="1"/>
             </a:lvl4pPr>
-            <a:lvl5pPr marL="1371600" indent="0">
+            <a:lvl5pPr marL="1274491" indent="0">
               <a:buNone/>
-              <a:defRPr sz="1200" b="1"/>
+              <a:defRPr sz="1115" b="1"/>
             </a:lvl5pPr>
-            <a:lvl6pPr marL="1714500" indent="0">
+            <a:lvl6pPr marL="1593113" indent="0">
               <a:buNone/>
-              <a:defRPr sz="1200" b="1"/>
+              <a:defRPr sz="1115" b="1"/>
             </a:lvl6pPr>
-            <a:lvl7pPr marL="2057400" indent="0">
+            <a:lvl7pPr marL="1911736" indent="0">
               <a:buNone/>
-              <a:defRPr sz="1200" b="1"/>
+              <a:defRPr sz="1115" b="1"/>
             </a:lvl7pPr>
-            <a:lvl8pPr marL="2400300" indent="0">
+            <a:lvl8pPr marL="2230359" indent="0">
               <a:buNone/>
-              <a:defRPr sz="1200" b="1"/>
+              <a:defRPr sz="1115" b="1"/>
             </a:lvl8pPr>
-            <a:lvl9pPr marL="2743200" indent="0">
+            <a:lvl9pPr marL="2548981" indent="0">
               <a:buNone/>
-              <a:defRPr sz="1200" b="1"/>
+              <a:defRPr sz="1115" b="1"/>
             </a:lvl9pPr>
           </a:lstStyle>
           <a:p>
             <a:pPr lvl="0"/>
             <a:r>
-              <a:rPr lang="it-IT"/>
-              <a:t>Fare clic per modificare gli stili del testo dello schema</a:t>
+              <a:rPr lang="en-US"/>
+              <a:t>Click to edit Master text styles</a:t>
             </a:r>
           </a:p>
         </p:txBody>
@@ -3698,8 +3993,8 @@
         </p:nvSpPr>
         <p:spPr>
           <a:xfrm>
-            <a:off x="472381" y="3618442"/>
-            <a:ext cx="2901255" cy="5322183"/>
+            <a:off x="438921" y="2064368"/>
+            <a:ext cx="2695749" cy="3036373"/>
           </a:xfrm>
         </p:spPr>
         <p:txBody>
@@ -3708,36 +4003,36 @@
           <a:p>
             <a:pPr lvl="0"/>
             <a:r>
-              <a:rPr lang="it-IT"/>
-              <a:t>Fare clic per modificare gli stili del testo dello schema</a:t>
+              <a:rPr lang="en-US"/>
+              <a:t>Click to edit Master text styles</a:t>
             </a:r>
           </a:p>
           <a:p>
             <a:pPr lvl="1"/>
             <a:r>
-              <a:rPr lang="it-IT"/>
-              <a:t>Secondo livello</a:t>
+              <a:rPr lang="en-US"/>
+              <a:t>Second level</a:t>
             </a:r>
           </a:p>
           <a:p>
             <a:pPr lvl="2"/>
             <a:r>
-              <a:rPr lang="it-IT"/>
-              <a:t>Terzo livello</a:t>
+              <a:rPr lang="en-US"/>
+              <a:t>Third level</a:t>
             </a:r>
           </a:p>
           <a:p>
             <a:pPr lvl="3"/>
             <a:r>
-              <a:rPr lang="it-IT"/>
-              <a:t>Quarto livello</a:t>
+              <a:rPr lang="en-US"/>
+              <a:t>Fourth level</a:t>
             </a:r>
           </a:p>
           <a:p>
             <a:pPr lvl="4"/>
             <a:r>
-              <a:rPr lang="it-IT"/>
-              <a:t>Quinto livello</a:t>
+              <a:rPr lang="en-US"/>
+              <a:t>Fifth level</a:t>
             </a:r>
             <a:endParaRPr lang="en-US" dirty="0"/>
           </a:p>
@@ -3755,8 +4050,8 @@
         </p:nvSpPr>
         <p:spPr>
           <a:xfrm>
-            <a:off x="3471863" y="2428347"/>
-            <a:ext cx="2915543" cy="1190095"/>
+            <a:off x="3225939" y="1385403"/>
+            <a:ext cx="2709026" cy="678965"/>
           </a:xfrm>
         </p:spPr>
         <p:txBody>
@@ -3764,46 +4059,46 @@
           <a:lstStyle>
             <a:lvl1pPr marL="0" indent="0">
               <a:buNone/>
-              <a:defRPr sz="1800" b="1"/>
+              <a:defRPr sz="1673" b="1"/>
             </a:lvl1pPr>
-            <a:lvl2pPr marL="342900" indent="0">
+            <a:lvl2pPr marL="318623" indent="0">
               <a:buNone/>
-              <a:defRPr sz="1500" b="1"/>
+              <a:defRPr sz="1394" b="1"/>
             </a:lvl2pPr>
-            <a:lvl3pPr marL="685800" indent="0">
+            <a:lvl3pPr marL="637245" indent="0">
               <a:buNone/>
-              <a:defRPr sz="1350" b="1"/>
+              <a:defRPr sz="1254" b="1"/>
             </a:lvl3pPr>
-            <a:lvl4pPr marL="1028700" indent="0">
+            <a:lvl4pPr marL="955868" indent="0">
               <a:buNone/>
-              <a:defRPr sz="1200" b="1"/>
+              <a:defRPr sz="1115" b="1"/>
             </a:lvl4pPr>
-            <a:lvl5pPr marL="1371600" indent="0">
+            <a:lvl5pPr marL="1274491" indent="0">
               <a:buNone/>
-              <a:defRPr sz="1200" b="1"/>
+              <a:defRPr sz="1115" b="1"/>
             </a:lvl5pPr>
-            <a:lvl6pPr marL="1714500" indent="0">
+            <a:lvl6pPr marL="1593113" indent="0">
               <a:buNone/>
-              <a:defRPr sz="1200" b="1"/>
+              <a:defRPr sz="1115" b="1"/>
             </a:lvl6pPr>
-            <a:lvl7pPr marL="2057400" indent="0">
+            <a:lvl7pPr marL="1911736" indent="0">
               <a:buNone/>
-              <a:defRPr sz="1200" b="1"/>
+              <a:defRPr sz="1115" b="1"/>
             </a:lvl7pPr>
-            <a:lvl8pPr marL="2400300" indent="0">
+            <a:lvl8pPr marL="2230359" indent="0">
               <a:buNone/>
-              <a:defRPr sz="1200" b="1"/>
+              <a:defRPr sz="1115" b="1"/>
             </a:lvl8pPr>
-            <a:lvl9pPr marL="2743200" indent="0">
+            <a:lvl9pPr marL="2548981" indent="0">
               <a:buNone/>
-              <a:defRPr sz="1200" b="1"/>
+              <a:defRPr sz="1115" b="1"/>
             </a:lvl9pPr>
           </a:lstStyle>
           <a:p>
             <a:pPr lvl="0"/>
             <a:r>
-              <a:rPr lang="it-IT"/>
-              <a:t>Fare clic per modificare gli stili del testo dello schema</a:t>
+              <a:rPr lang="en-US"/>
+              <a:t>Click to edit Master text styles</a:t>
             </a:r>
           </a:p>
         </p:txBody>
@@ -3820,8 +4115,8 @@
         </p:nvSpPr>
         <p:spPr>
           <a:xfrm>
-            <a:off x="3471863" y="3618442"/>
-            <a:ext cx="2915543" cy="5322183"/>
+            <a:off x="3225939" y="2064368"/>
+            <a:ext cx="2709026" cy="3036373"/>
           </a:xfrm>
         </p:spPr>
         <p:txBody>
@@ -3830,36 +4125,36 @@
           <a:p>
             <a:pPr lvl="0"/>
             <a:r>
-              <a:rPr lang="it-IT"/>
-              <a:t>Fare clic per modificare gli stili del testo dello schema</a:t>
+              <a:rPr lang="en-US"/>
+              <a:t>Click to edit Master text styles</a:t>
             </a:r>
           </a:p>
           <a:p>
             <a:pPr lvl="1"/>
             <a:r>
-              <a:rPr lang="it-IT"/>
-              <a:t>Secondo livello</a:t>
+              <a:rPr lang="en-US"/>
+              <a:t>Second level</a:t>
             </a:r>
           </a:p>
           <a:p>
             <a:pPr lvl="2"/>
             <a:r>
-              <a:rPr lang="it-IT"/>
-              <a:t>Terzo livello</a:t>
+              <a:rPr lang="en-US"/>
+              <a:t>Third level</a:t>
             </a:r>
           </a:p>
           <a:p>
             <a:pPr lvl="3"/>
             <a:r>
-              <a:rPr lang="it-IT"/>
-              <a:t>Quarto livello</a:t>
+              <a:rPr lang="en-US"/>
+              <a:t>Fourth level</a:t>
             </a:r>
           </a:p>
           <a:p>
             <a:pPr lvl="4"/>
             <a:r>
-              <a:rPr lang="it-IT"/>
-              <a:t>Quinto livello</a:t>
+              <a:rPr lang="en-US"/>
+              <a:t>Fifth level</a:t>
             </a:r>
             <a:endParaRPr lang="en-US" dirty="0"/>
           </a:p>
@@ -3882,7 +4177,7 @@
           <a:p>
             <a:fld id="{162587DE-05E3-4A7B-A434-975C0FFAAAE7}" type="datetimeFigureOut">
               <a:rPr lang="en-GB" smtClean="0"/>
-              <a:t>03/12/2020</a:t>
+              <a:t>22/01/2021</a:t>
             </a:fld>
             <a:endParaRPr lang="en-GB"/>
           </a:p>
@@ -3933,7 +4228,7 @@
     </p:spTree>
     <p:extLst>
       <p:ext uri="{BB962C8B-B14F-4D97-AF65-F5344CB8AC3E}">
-        <p14:creationId xmlns:p14="http://schemas.microsoft.com/office/powerpoint/2010/main" val="2839220965"/>
+        <p14:creationId xmlns:p14="http://schemas.microsoft.com/office/powerpoint/2010/main" val="1096194522"/>
       </p:ext>
     </p:extLst>
   </p:cSld>
@@ -3945,7 +4240,7 @@
 
 <file path=ppt/slideLayouts/slideLayout6.xml><?xml version="1.0" encoding="utf-8"?>
 <p:sldLayout xmlns:a="http://schemas.openxmlformats.org/drawingml/2006/main" xmlns:r="http://schemas.openxmlformats.org/officeDocument/2006/relationships" xmlns:p="http://schemas.openxmlformats.org/presentationml/2006/main" type="titleOnly" preserve="1">
-  <p:cSld name="Solo titolo">
+  <p:cSld name="Title Only">
     <p:spTree>
       <p:nvGrpSpPr>
         <p:cNvPr id="1" name=""/>
@@ -3976,8 +4271,8 @@
           <a:lstStyle/>
           <a:p>
             <a:r>
-              <a:rPr lang="it-IT"/>
-              <a:t>Fare clic per modificare lo stile del titolo dello schema</a:t>
+              <a:rPr lang="en-US"/>
+              <a:t>Click to edit Master title style</a:t>
             </a:r>
             <a:endParaRPr lang="en-US" dirty="0"/>
           </a:p>
@@ -4000,7 +4295,7 @@
           <a:p>
             <a:fld id="{162587DE-05E3-4A7B-A434-975C0FFAAAE7}" type="datetimeFigureOut">
               <a:rPr lang="en-GB" smtClean="0"/>
-              <a:t>03/12/2020</a:t>
+              <a:t>22/01/2021</a:t>
             </a:fld>
             <a:endParaRPr lang="en-GB"/>
           </a:p>
@@ -4051,7 +4346,7 @@
     </p:spTree>
     <p:extLst>
       <p:ext uri="{BB962C8B-B14F-4D97-AF65-F5344CB8AC3E}">
-        <p14:creationId xmlns:p14="http://schemas.microsoft.com/office/powerpoint/2010/main" val="132089616"/>
+        <p14:creationId xmlns:p14="http://schemas.microsoft.com/office/powerpoint/2010/main" val="3510434356"/>
       </p:ext>
     </p:extLst>
   </p:cSld>
@@ -4063,7 +4358,7 @@
 
 <file path=ppt/slideLayouts/slideLayout7.xml><?xml version="1.0" encoding="utf-8"?>
 <p:sldLayout xmlns:a="http://schemas.openxmlformats.org/drawingml/2006/main" xmlns:r="http://schemas.openxmlformats.org/officeDocument/2006/relationships" xmlns:p="http://schemas.openxmlformats.org/presentationml/2006/main" type="blank" preserve="1">
-  <p:cSld name="Vuota">
+  <p:cSld name="Blank">
     <p:spTree>
       <p:nvGrpSpPr>
         <p:cNvPr id="1" name=""/>
@@ -4095,7 +4390,7 @@
           <a:p>
             <a:fld id="{162587DE-05E3-4A7B-A434-975C0FFAAAE7}" type="datetimeFigureOut">
               <a:rPr lang="en-GB" smtClean="0"/>
-              <a:t>03/12/2020</a:t>
+              <a:t>22/01/2021</a:t>
             </a:fld>
             <a:endParaRPr lang="en-GB"/>
           </a:p>
@@ -4146,7 +4441,7 @@
     </p:spTree>
     <p:extLst>
       <p:ext uri="{BB962C8B-B14F-4D97-AF65-F5344CB8AC3E}">
-        <p14:creationId xmlns:p14="http://schemas.microsoft.com/office/powerpoint/2010/main" val="2280904949"/>
+        <p14:creationId xmlns:p14="http://schemas.microsoft.com/office/powerpoint/2010/main" val="4272372488"/>
       </p:ext>
     </p:extLst>
   </p:cSld>
@@ -4158,7 +4453,7 @@
 
 <file path=ppt/slideLayouts/slideLayout8.xml><?xml version="1.0" encoding="utf-8"?>
 <p:sldLayout xmlns:a="http://schemas.openxmlformats.org/drawingml/2006/main" xmlns:r="http://schemas.openxmlformats.org/officeDocument/2006/relationships" xmlns:p="http://schemas.openxmlformats.org/presentationml/2006/main" type="objTx" preserve="1">
-  <p:cSld name="Contenuto con didascalia">
+  <p:cSld name="Content with Caption">
     <p:spTree>
       <p:nvGrpSpPr>
         <p:cNvPr id="1" name=""/>
@@ -4185,21 +4480,21 @@
         </p:nvSpPr>
         <p:spPr>
           <a:xfrm>
-            <a:off x="472381" y="660400"/>
-            <a:ext cx="2211884" cy="2311400"/>
+            <a:off x="438921" y="376767"/>
+            <a:ext cx="2055208" cy="1318683"/>
           </a:xfrm>
         </p:spPr>
         <p:txBody>
           <a:bodyPr anchor="b"/>
           <a:lstStyle>
             <a:lvl1pPr>
-              <a:defRPr sz="2400"/>
+              <a:defRPr sz="2230"/>
             </a:lvl1pPr>
           </a:lstStyle>
           <a:p>
             <a:r>
-              <a:rPr lang="it-IT"/>
-              <a:t>Fare clic per modificare lo stile del titolo dello schema</a:t>
+              <a:rPr lang="en-US"/>
+              <a:t>Click to edit Master title style</a:t>
             </a:r>
             <a:endParaRPr lang="en-US" dirty="0"/>
           </a:p>
@@ -4217,74 +4512,74 @@
         </p:nvSpPr>
         <p:spPr>
           <a:xfrm>
-            <a:off x="2915543" y="1426283"/>
-            <a:ext cx="3471863" cy="7039681"/>
+            <a:off x="2709026" y="813713"/>
+            <a:ext cx="3225939" cy="4016228"/>
           </a:xfrm>
         </p:spPr>
         <p:txBody>
           <a:bodyPr/>
           <a:lstStyle>
             <a:lvl1pPr>
-              <a:defRPr sz="2400"/>
+              <a:defRPr sz="2230"/>
             </a:lvl1pPr>
             <a:lvl2pPr>
-              <a:defRPr sz="2100"/>
+              <a:defRPr sz="1951"/>
             </a:lvl2pPr>
             <a:lvl3pPr>
-              <a:defRPr sz="1800"/>
+              <a:defRPr sz="1673"/>
             </a:lvl3pPr>
             <a:lvl4pPr>
-              <a:defRPr sz="1500"/>
+              <a:defRPr sz="1394"/>
             </a:lvl4pPr>
             <a:lvl5pPr>
-              <a:defRPr sz="1500"/>
+              <a:defRPr sz="1394"/>
             </a:lvl5pPr>
             <a:lvl6pPr>
-              <a:defRPr sz="1500"/>
+              <a:defRPr sz="1394"/>
             </a:lvl6pPr>
             <a:lvl7pPr>
-              <a:defRPr sz="1500"/>
+              <a:defRPr sz="1394"/>
             </a:lvl7pPr>
             <a:lvl8pPr>
-              <a:defRPr sz="1500"/>
+              <a:defRPr sz="1394"/>
             </a:lvl8pPr>
             <a:lvl9pPr>
-              <a:defRPr sz="1500"/>
+              <a:defRPr sz="1394"/>
             </a:lvl9pPr>
           </a:lstStyle>
           <a:p>
             <a:pPr lvl="0"/>
             <a:r>
-              <a:rPr lang="it-IT"/>
-              <a:t>Fare clic per modificare gli stili del testo dello schema</a:t>
+              <a:rPr lang="en-US"/>
+              <a:t>Click to edit Master text styles</a:t>
             </a:r>
           </a:p>
           <a:p>
             <a:pPr lvl="1"/>
             <a:r>
-              <a:rPr lang="it-IT"/>
-              <a:t>Secondo livello</a:t>
+              <a:rPr lang="en-US"/>
+              <a:t>Second level</a:t>
             </a:r>
           </a:p>
           <a:p>
             <a:pPr lvl="2"/>
             <a:r>
-              <a:rPr lang="it-IT"/>
-              <a:t>Terzo livello</a:t>
+              <a:rPr lang="en-US"/>
+              <a:t>Third level</a:t>
             </a:r>
           </a:p>
           <a:p>
             <a:pPr lvl="3"/>
             <a:r>
-              <a:rPr lang="it-IT"/>
-              <a:t>Quarto livello</a:t>
+              <a:rPr lang="en-US"/>
+              <a:t>Fourth level</a:t>
             </a:r>
           </a:p>
           <a:p>
             <a:pPr lvl="4"/>
             <a:r>
-              <a:rPr lang="it-IT"/>
-              <a:t>Quinto livello</a:t>
+              <a:rPr lang="en-US"/>
+              <a:t>Fifth level</a:t>
             </a:r>
             <a:endParaRPr lang="en-US" dirty="0"/>
           </a:p>
@@ -4302,8 +4597,8 @@
         </p:nvSpPr>
         <p:spPr>
           <a:xfrm>
-            <a:off x="472381" y="2971800"/>
-            <a:ext cx="2211884" cy="5505627"/>
+            <a:off x="438921" y="1695450"/>
+            <a:ext cx="2055208" cy="3141031"/>
           </a:xfrm>
         </p:spPr>
         <p:txBody>
@@ -4311,46 +4606,46 @@
           <a:lstStyle>
             <a:lvl1pPr marL="0" indent="0">
               <a:buNone/>
-              <a:defRPr sz="1200"/>
+              <a:defRPr sz="1115"/>
             </a:lvl1pPr>
-            <a:lvl2pPr marL="342900" indent="0">
+            <a:lvl2pPr marL="318623" indent="0">
               <a:buNone/>
-              <a:defRPr sz="1050"/>
+              <a:defRPr sz="976"/>
             </a:lvl2pPr>
-            <a:lvl3pPr marL="685800" indent="0">
+            <a:lvl3pPr marL="637245" indent="0">
               <a:buNone/>
-              <a:defRPr sz="900"/>
+              <a:defRPr sz="836"/>
             </a:lvl3pPr>
-            <a:lvl4pPr marL="1028700" indent="0">
+            <a:lvl4pPr marL="955868" indent="0">
               <a:buNone/>
-              <a:defRPr sz="750"/>
+              <a:defRPr sz="697"/>
             </a:lvl4pPr>
-            <a:lvl5pPr marL="1371600" indent="0">
+            <a:lvl5pPr marL="1274491" indent="0">
               <a:buNone/>
-              <a:defRPr sz="750"/>
+              <a:defRPr sz="697"/>
             </a:lvl5pPr>
-            <a:lvl6pPr marL="1714500" indent="0">
+            <a:lvl6pPr marL="1593113" indent="0">
               <a:buNone/>
-              <a:defRPr sz="750"/>
+              <a:defRPr sz="697"/>
             </a:lvl6pPr>
-            <a:lvl7pPr marL="2057400" indent="0">
+            <a:lvl7pPr marL="1911736" indent="0">
               <a:buNone/>
-              <a:defRPr sz="750"/>
+              <a:defRPr sz="697"/>
             </a:lvl7pPr>
-            <a:lvl8pPr marL="2400300" indent="0">
+            <a:lvl8pPr marL="2230359" indent="0">
               <a:buNone/>
-              <a:defRPr sz="750"/>
+              <a:defRPr sz="697"/>
             </a:lvl8pPr>
-            <a:lvl9pPr marL="2743200" indent="0">
+            <a:lvl9pPr marL="2548981" indent="0">
               <a:buNone/>
-              <a:defRPr sz="750"/>
+              <a:defRPr sz="697"/>
             </a:lvl9pPr>
           </a:lstStyle>
           <a:p>
             <a:pPr lvl="0"/>
             <a:r>
-              <a:rPr lang="it-IT"/>
-              <a:t>Fare clic per modificare gli stili del testo dello schema</a:t>
+              <a:rPr lang="en-US"/>
+              <a:t>Click to edit Master text styles</a:t>
             </a:r>
           </a:p>
         </p:txBody>
@@ -4372,7 +4667,7 @@
           <a:p>
             <a:fld id="{162587DE-05E3-4A7B-A434-975C0FFAAAE7}" type="datetimeFigureOut">
               <a:rPr lang="en-GB" smtClean="0"/>
-              <a:t>03/12/2020</a:t>
+              <a:t>22/01/2021</a:t>
             </a:fld>
             <a:endParaRPr lang="en-GB"/>
           </a:p>
@@ -4423,7 +4718,7 @@
     </p:spTree>
     <p:extLst>
       <p:ext uri="{BB962C8B-B14F-4D97-AF65-F5344CB8AC3E}">
-        <p14:creationId xmlns:p14="http://schemas.microsoft.com/office/powerpoint/2010/main" val="2947478035"/>
+        <p14:creationId xmlns:p14="http://schemas.microsoft.com/office/powerpoint/2010/main" val="2283547138"/>
       </p:ext>
     </p:extLst>
   </p:cSld>
@@ -4435,7 +4730,7 @@
 
 <file path=ppt/slideLayouts/slideLayout9.xml><?xml version="1.0" encoding="utf-8"?>
 <p:sldLayout xmlns:a="http://schemas.openxmlformats.org/drawingml/2006/main" xmlns:r="http://schemas.openxmlformats.org/officeDocument/2006/relationships" xmlns:p="http://schemas.openxmlformats.org/presentationml/2006/main" type="picTx" preserve="1">
-  <p:cSld name="Immagine con didascalia">
+  <p:cSld name="Picture with Caption">
     <p:spTree>
       <p:nvGrpSpPr>
         <p:cNvPr id="1" name=""/>
@@ -4462,21 +4757,21 @@
         </p:nvSpPr>
         <p:spPr>
           <a:xfrm>
-            <a:off x="472381" y="660400"/>
-            <a:ext cx="2211884" cy="2311400"/>
+            <a:off x="438921" y="376767"/>
+            <a:ext cx="2055208" cy="1318683"/>
           </a:xfrm>
         </p:spPr>
         <p:txBody>
           <a:bodyPr anchor="b"/>
           <a:lstStyle>
             <a:lvl1pPr>
-              <a:defRPr sz="2400"/>
+              <a:defRPr sz="2230"/>
             </a:lvl1pPr>
           </a:lstStyle>
           <a:p>
             <a:r>
-              <a:rPr lang="it-IT"/>
-              <a:t>Fare clic per modificare lo stile del titolo dello schema</a:t>
+              <a:rPr lang="en-US"/>
+              <a:t>Click to edit Master title style</a:t>
             </a:r>
             <a:endParaRPr lang="en-US" dirty="0"/>
           </a:p>
@@ -4494,8 +4789,8 @@
         </p:nvSpPr>
         <p:spPr>
           <a:xfrm>
-            <a:off x="2915543" y="1426283"/>
-            <a:ext cx="3471863" cy="7039681"/>
+            <a:off x="2709026" y="813713"/>
+            <a:ext cx="3225939" cy="4016228"/>
           </a:xfrm>
         </p:spPr>
         <p:txBody>
@@ -4503,45 +4798,45 @@
           <a:lstStyle>
             <a:lvl1pPr marL="0" indent="0">
               <a:buNone/>
-              <a:defRPr sz="2400"/>
+              <a:defRPr sz="2230"/>
             </a:lvl1pPr>
-            <a:lvl2pPr marL="342900" indent="0">
+            <a:lvl2pPr marL="318623" indent="0">
               <a:buNone/>
-              <a:defRPr sz="2100"/>
+              <a:defRPr sz="1951"/>
             </a:lvl2pPr>
-            <a:lvl3pPr marL="685800" indent="0">
+            <a:lvl3pPr marL="637245" indent="0">
               <a:buNone/>
-              <a:defRPr sz="1800"/>
+              <a:defRPr sz="1673"/>
             </a:lvl3pPr>
-            <a:lvl4pPr marL="1028700" indent="0">
+            <a:lvl4pPr marL="955868" indent="0">
               <a:buNone/>
-              <a:defRPr sz="1500"/>
+              <a:defRPr sz="1394"/>
             </a:lvl4pPr>
-            <a:lvl5pPr marL="1371600" indent="0">
+            <a:lvl5pPr marL="1274491" indent="0">
               <a:buNone/>
-              <a:defRPr sz="1500"/>
+              <a:defRPr sz="1394"/>
             </a:lvl5pPr>
-            <a:lvl6pPr marL="1714500" indent="0">
+            <a:lvl6pPr marL="1593113" indent="0">
               <a:buNone/>
-              <a:defRPr sz="1500"/>
+              <a:defRPr sz="1394"/>
             </a:lvl6pPr>
-            <a:lvl7pPr marL="2057400" indent="0">
+            <a:lvl7pPr marL="1911736" indent="0">
               <a:buNone/>
-              <a:defRPr sz="1500"/>
+              <a:defRPr sz="1394"/>
             </a:lvl7pPr>
-            <a:lvl8pPr marL="2400300" indent="0">
+            <a:lvl8pPr marL="2230359" indent="0">
               <a:buNone/>
-              <a:defRPr sz="1500"/>
+              <a:defRPr sz="1394"/>
             </a:lvl8pPr>
-            <a:lvl9pPr marL="2743200" indent="0">
+            <a:lvl9pPr marL="2548981" indent="0">
               <a:buNone/>
-              <a:defRPr sz="1500"/>
+              <a:defRPr sz="1394"/>
             </a:lvl9pPr>
           </a:lstStyle>
           <a:p>
             <a:r>
-              <a:rPr lang="it-IT"/>
-              <a:t>Fare clic sull'icona per inserire un'immagine</a:t>
+              <a:rPr lang="en-US"/>
+              <a:t>Click icon to add picture</a:t>
             </a:r>
             <a:endParaRPr lang="en-US" dirty="0"/>
           </a:p>
@@ -4559,8 +4854,8 @@
         </p:nvSpPr>
         <p:spPr>
           <a:xfrm>
-            <a:off x="472381" y="2971800"/>
-            <a:ext cx="2211884" cy="5505627"/>
+            <a:off x="438921" y="1695450"/>
+            <a:ext cx="2055208" cy="3141031"/>
           </a:xfrm>
         </p:spPr>
         <p:txBody>
@@ -4568,46 +4863,46 @@
           <a:lstStyle>
             <a:lvl1pPr marL="0" indent="0">
               <a:buNone/>
-              <a:defRPr sz="1200"/>
+              <a:defRPr sz="1115"/>
             </a:lvl1pPr>
-            <a:lvl2pPr marL="342900" indent="0">
+            <a:lvl2pPr marL="318623" indent="0">
               <a:buNone/>
-              <a:defRPr sz="1050"/>
+              <a:defRPr sz="976"/>
             </a:lvl2pPr>
-            <a:lvl3pPr marL="685800" indent="0">
+            <a:lvl3pPr marL="637245" indent="0">
               <a:buNone/>
-              <a:defRPr sz="900"/>
+              <a:defRPr sz="836"/>
             </a:lvl3pPr>
-            <a:lvl4pPr marL="1028700" indent="0">
+            <a:lvl4pPr marL="955868" indent="0">
               <a:buNone/>
-              <a:defRPr sz="750"/>
+              <a:defRPr sz="697"/>
             </a:lvl4pPr>
-            <a:lvl5pPr marL="1371600" indent="0">
+            <a:lvl5pPr marL="1274491" indent="0">
               <a:buNone/>
-              <a:defRPr sz="750"/>
+              <a:defRPr sz="697"/>
             </a:lvl5pPr>
-            <a:lvl6pPr marL="1714500" indent="0">
+            <a:lvl6pPr marL="1593113" indent="0">
               <a:buNone/>
-              <a:defRPr sz="750"/>
+              <a:defRPr sz="697"/>
             </a:lvl6pPr>
-            <a:lvl7pPr marL="2057400" indent="0">
+            <a:lvl7pPr marL="1911736" indent="0">
               <a:buNone/>
-              <a:defRPr sz="750"/>
+              <a:defRPr sz="697"/>
             </a:lvl7pPr>
-            <a:lvl8pPr marL="2400300" indent="0">
+            <a:lvl8pPr marL="2230359" indent="0">
               <a:buNone/>
-              <a:defRPr sz="750"/>
+              <a:defRPr sz="697"/>
             </a:lvl8pPr>
-            <a:lvl9pPr marL="2743200" indent="0">
+            <a:lvl9pPr marL="2548981" indent="0">
               <a:buNone/>
-              <a:defRPr sz="750"/>
+              <a:defRPr sz="697"/>
             </a:lvl9pPr>
           </a:lstStyle>
           <a:p>
             <a:pPr lvl="0"/>
             <a:r>
-              <a:rPr lang="it-IT"/>
-              <a:t>Fare clic per modificare gli stili del testo dello schema</a:t>
+              <a:rPr lang="en-US"/>
+              <a:t>Click to edit Master text styles</a:t>
             </a:r>
           </a:p>
         </p:txBody>
@@ -4629,7 +4924,7 @@
           <a:p>
             <a:fld id="{162587DE-05E3-4A7B-A434-975C0FFAAAE7}" type="datetimeFigureOut">
               <a:rPr lang="en-GB" smtClean="0"/>
-              <a:t>03/12/2020</a:t>
+              <a:t>22/01/2021</a:t>
             </a:fld>
             <a:endParaRPr lang="en-GB"/>
           </a:p>
@@ -4680,7 +4975,7 @@
     </p:spTree>
     <p:extLst>
       <p:ext uri="{BB962C8B-B14F-4D97-AF65-F5344CB8AC3E}">
-        <p14:creationId xmlns:p14="http://schemas.microsoft.com/office/powerpoint/2010/main" val="178356559"/>
+        <p14:creationId xmlns:p14="http://schemas.microsoft.com/office/powerpoint/2010/main" val="1665815634"/>
       </p:ext>
     </p:extLst>
   </p:cSld>
@@ -4724,8 +5019,8 @@
         </p:nvSpPr>
         <p:spPr>
           <a:xfrm>
-            <a:off x="471488" y="527405"/>
-            <a:ext cx="5915025" cy="1914702"/>
+            <a:off x="438091" y="300891"/>
+            <a:ext cx="5496044" cy="1092362"/>
           </a:xfrm>
           <a:prstGeom prst="rect">
             <a:avLst/>
@@ -4738,8 +5033,8 @@
           <a:lstStyle/>
           <a:p>
             <a:r>
-              <a:rPr lang="it-IT"/>
-              <a:t>Fare clic per modificare lo stile del titolo dello schema</a:t>
+              <a:rPr lang="en-US"/>
+              <a:t>Click to edit Master title style</a:t>
             </a:r>
             <a:endParaRPr lang="en-US" dirty="0"/>
           </a:p>
@@ -4757,8 +5052,8 @@
         </p:nvSpPr>
         <p:spPr>
           <a:xfrm>
-            <a:off x="471488" y="2637014"/>
-            <a:ext cx="5915025" cy="6285266"/>
+            <a:off x="438091" y="1504450"/>
+            <a:ext cx="5496044" cy="3585825"/>
           </a:xfrm>
           <a:prstGeom prst="rect">
             <a:avLst/>
@@ -4772,36 +5067,36 @@
           <a:p>
             <a:pPr lvl="0"/>
             <a:r>
-              <a:rPr lang="it-IT"/>
-              <a:t>Fare clic per modificare gli stili del testo dello schema</a:t>
+              <a:rPr lang="en-US"/>
+              <a:t>Click to edit Master text styles</a:t>
             </a:r>
           </a:p>
           <a:p>
             <a:pPr lvl="1"/>
             <a:r>
-              <a:rPr lang="it-IT"/>
-              <a:t>Secondo livello</a:t>
+              <a:rPr lang="en-US"/>
+              <a:t>Second level</a:t>
             </a:r>
           </a:p>
           <a:p>
             <a:pPr lvl="2"/>
             <a:r>
-              <a:rPr lang="it-IT"/>
-              <a:t>Terzo livello</a:t>
+              <a:rPr lang="en-US"/>
+              <a:t>Third level</a:t>
             </a:r>
           </a:p>
           <a:p>
             <a:pPr lvl="3"/>
             <a:r>
-              <a:rPr lang="it-IT"/>
-              <a:t>Quarto livello</a:t>
+              <a:rPr lang="en-US"/>
+              <a:t>Fourth level</a:t>
             </a:r>
           </a:p>
           <a:p>
             <a:pPr lvl="4"/>
             <a:r>
-              <a:rPr lang="it-IT"/>
-              <a:t>Quinto livello</a:t>
+              <a:rPr lang="en-US"/>
+              <a:t>Fifth level</a:t>
             </a:r>
             <a:endParaRPr lang="en-US" dirty="0"/>
           </a:p>
@@ -4819,8 +5114,8 @@
         </p:nvSpPr>
         <p:spPr>
           <a:xfrm>
-            <a:off x="471488" y="9181397"/>
-            <a:ext cx="1543050" cy="527403"/>
+            <a:off x="438090" y="5238105"/>
+            <a:ext cx="1433751" cy="300890"/>
           </a:xfrm>
           <a:prstGeom prst="rect">
             <a:avLst/>
@@ -4830,7 +5125,7 @@
           <a:bodyPr vert="horz" lIns="91440" tIns="45720" rIns="91440" bIns="45720" rtlCol="0" anchor="ctr"/>
           <a:lstStyle>
             <a:lvl1pPr algn="l">
-              <a:defRPr sz="900">
+              <a:defRPr sz="836">
                 <a:solidFill>
                   <a:schemeClr val="tx1">
                     <a:tint val="75000"/>
@@ -4842,7 +5137,7 @@
           <a:p>
             <a:fld id="{162587DE-05E3-4A7B-A434-975C0FFAAAE7}" type="datetimeFigureOut">
               <a:rPr lang="en-GB" smtClean="0"/>
-              <a:t>03/12/2020</a:t>
+              <a:t>22/01/2021</a:t>
             </a:fld>
             <a:endParaRPr lang="en-GB"/>
           </a:p>
@@ -4860,8 +5155,8 @@
         </p:nvSpPr>
         <p:spPr>
           <a:xfrm>
-            <a:off x="2271713" y="9181397"/>
-            <a:ext cx="2314575" cy="527403"/>
+            <a:off x="2110800" y="5238105"/>
+            <a:ext cx="2150626" cy="300890"/>
           </a:xfrm>
           <a:prstGeom prst="rect">
             <a:avLst/>
@@ -4871,7 +5166,7 @@
           <a:bodyPr vert="horz" lIns="91440" tIns="45720" rIns="91440" bIns="45720" rtlCol="0" anchor="ctr"/>
           <a:lstStyle>
             <a:lvl1pPr algn="ctr">
-              <a:defRPr sz="900">
+              <a:defRPr sz="836">
                 <a:solidFill>
                   <a:schemeClr val="tx1">
                     <a:tint val="75000"/>
@@ -4897,8 +5192,8 @@
         </p:nvSpPr>
         <p:spPr>
           <a:xfrm>
-            <a:off x="4843463" y="9181397"/>
-            <a:ext cx="1543050" cy="527403"/>
+            <a:off x="4500384" y="5238105"/>
+            <a:ext cx="1433751" cy="300890"/>
           </a:xfrm>
           <a:prstGeom prst="rect">
             <a:avLst/>
@@ -4908,7 +5203,7 @@
           <a:bodyPr vert="horz" lIns="91440" tIns="45720" rIns="91440" bIns="45720" rtlCol="0" anchor="ctr"/>
           <a:lstStyle>
             <a:lvl1pPr algn="r">
-              <a:defRPr sz="900">
+              <a:defRPr sz="836">
                 <a:solidFill>
                   <a:schemeClr val="tx1">
                     <a:tint val="75000"/>
@@ -4929,27 +5224,27 @@
     </p:spTree>
     <p:extLst>
       <p:ext uri="{BB962C8B-B14F-4D97-AF65-F5344CB8AC3E}">
-        <p14:creationId xmlns:p14="http://schemas.microsoft.com/office/powerpoint/2010/main" val="649504618"/>
+        <p14:creationId xmlns:p14="http://schemas.microsoft.com/office/powerpoint/2010/main" val="829135029"/>
       </p:ext>
     </p:extLst>
   </p:cSld>
   <p:clrMap bg1="lt1" tx1="dk1" bg2="lt2" tx2="dk2" accent1="accent1" accent2="accent2" accent3="accent3" accent4="accent4" accent5="accent5" accent6="accent6" hlink="hlink" folHlink="folHlink"/>
   <p:sldLayoutIdLst>
-    <p:sldLayoutId id="2147483661" r:id="rId1"/>
-    <p:sldLayoutId id="2147483662" r:id="rId2"/>
-    <p:sldLayoutId id="2147483663" r:id="rId3"/>
-    <p:sldLayoutId id="2147483664" r:id="rId4"/>
-    <p:sldLayoutId id="2147483665" r:id="rId5"/>
-    <p:sldLayoutId id="2147483666" r:id="rId6"/>
-    <p:sldLayoutId id="2147483667" r:id="rId7"/>
-    <p:sldLayoutId id="2147483668" r:id="rId8"/>
-    <p:sldLayoutId id="2147483669" r:id="rId9"/>
-    <p:sldLayoutId id="2147483670" r:id="rId10"/>
-    <p:sldLayoutId id="2147483671" r:id="rId11"/>
+    <p:sldLayoutId id="2147483673" r:id="rId1"/>
+    <p:sldLayoutId id="2147483674" r:id="rId2"/>
+    <p:sldLayoutId id="2147483675" r:id="rId3"/>
+    <p:sldLayoutId id="2147483676" r:id="rId4"/>
+    <p:sldLayoutId id="2147483677" r:id="rId5"/>
+    <p:sldLayoutId id="2147483678" r:id="rId6"/>
+    <p:sldLayoutId id="2147483679" r:id="rId7"/>
+    <p:sldLayoutId id="2147483680" r:id="rId8"/>
+    <p:sldLayoutId id="2147483681" r:id="rId9"/>
+    <p:sldLayoutId id="2147483682" r:id="rId10"/>
+    <p:sldLayoutId id="2147483683" r:id="rId11"/>
   </p:sldLayoutIdLst>
   <p:txStyles>
     <p:titleStyle>
-      <a:lvl1pPr algn="l" defTabSz="685800" rtl="0" eaLnBrk="1" latinLnBrk="0" hangingPunct="1">
+      <a:lvl1pPr algn="l" defTabSz="637245" rtl="0" eaLnBrk="1" latinLnBrk="0" hangingPunct="1">
         <a:lnSpc>
           <a:spcPct val="90000"/>
         </a:lnSpc>
@@ -4957,7 +5252,7 @@
           <a:spcPct val="0"/>
         </a:spcBef>
         <a:buNone/>
-        <a:defRPr sz="3300" kern="1200">
+        <a:defRPr sz="3066" kern="1200">
           <a:solidFill>
             <a:schemeClr val="tx1"/>
           </a:solidFill>
@@ -4968,16 +5263,16 @@
       </a:lvl1pPr>
     </p:titleStyle>
     <p:bodyStyle>
-      <a:lvl1pPr marL="171450" indent="-171450" algn="l" defTabSz="685800" rtl="0" eaLnBrk="1" latinLnBrk="0" hangingPunct="1">
+      <a:lvl1pPr marL="159311" indent="-159311" algn="l" defTabSz="637245" rtl="0" eaLnBrk="1" latinLnBrk="0" hangingPunct="1">
         <a:lnSpc>
           <a:spcPct val="90000"/>
         </a:lnSpc>
         <a:spcBef>
-          <a:spcPts val="750"/>
+          <a:spcPts val="697"/>
         </a:spcBef>
         <a:buFont typeface="Arial" panose="020B0604020202020204" pitchFamily="34" charset="0"/>
         <a:buChar char="•"/>
-        <a:defRPr sz="2100" kern="1200">
+        <a:defRPr sz="1951" kern="1200">
           <a:solidFill>
             <a:schemeClr val="tx1"/>
           </a:solidFill>
@@ -4986,16 +5281,16 @@
           <a:cs typeface="+mn-cs"/>
         </a:defRPr>
       </a:lvl1pPr>
-      <a:lvl2pPr marL="514350" indent="-171450" algn="l" defTabSz="685800" rtl="0" eaLnBrk="1" latinLnBrk="0" hangingPunct="1">
+      <a:lvl2pPr marL="477934" indent="-159311" algn="l" defTabSz="637245" rtl="0" eaLnBrk="1" latinLnBrk="0" hangingPunct="1">
         <a:lnSpc>
           <a:spcPct val="90000"/>
         </a:lnSpc>
         <a:spcBef>
-          <a:spcPts val="375"/>
+          <a:spcPts val="348"/>
         </a:spcBef>
         <a:buFont typeface="Arial" panose="020B0604020202020204" pitchFamily="34" charset="0"/>
         <a:buChar char="•"/>
-        <a:defRPr sz="1800" kern="1200">
+        <a:defRPr sz="1673" kern="1200">
           <a:solidFill>
             <a:schemeClr val="tx1"/>
           </a:solidFill>
@@ -5004,16 +5299,16 @@
           <a:cs typeface="+mn-cs"/>
         </a:defRPr>
       </a:lvl2pPr>
-      <a:lvl3pPr marL="857250" indent="-171450" algn="l" defTabSz="685800" rtl="0" eaLnBrk="1" latinLnBrk="0" hangingPunct="1">
+      <a:lvl3pPr marL="796557" indent="-159311" algn="l" defTabSz="637245" rtl="0" eaLnBrk="1" latinLnBrk="0" hangingPunct="1">
         <a:lnSpc>
           <a:spcPct val="90000"/>
         </a:lnSpc>
         <a:spcBef>
-          <a:spcPts val="375"/>
+          <a:spcPts val="348"/>
         </a:spcBef>
         <a:buFont typeface="Arial" panose="020B0604020202020204" pitchFamily="34" charset="0"/>
         <a:buChar char="•"/>
-        <a:defRPr sz="1500" kern="1200">
+        <a:defRPr sz="1394" kern="1200">
           <a:solidFill>
             <a:schemeClr val="tx1"/>
           </a:solidFill>
@@ -5022,16 +5317,16 @@
           <a:cs typeface="+mn-cs"/>
         </a:defRPr>
       </a:lvl3pPr>
-      <a:lvl4pPr marL="1200150" indent="-171450" algn="l" defTabSz="685800" rtl="0" eaLnBrk="1" latinLnBrk="0" hangingPunct="1">
+      <a:lvl4pPr marL="1115179" indent="-159311" algn="l" defTabSz="637245" rtl="0" eaLnBrk="1" latinLnBrk="0" hangingPunct="1">
         <a:lnSpc>
           <a:spcPct val="90000"/>
         </a:lnSpc>
         <a:spcBef>
-          <a:spcPts val="375"/>
+          <a:spcPts val="348"/>
         </a:spcBef>
         <a:buFont typeface="Arial" panose="020B0604020202020204" pitchFamily="34" charset="0"/>
         <a:buChar char="•"/>
-        <a:defRPr sz="1350" kern="1200">
+        <a:defRPr sz="1254" kern="1200">
           <a:solidFill>
             <a:schemeClr val="tx1"/>
           </a:solidFill>
@@ -5040,16 +5335,16 @@
           <a:cs typeface="+mn-cs"/>
         </a:defRPr>
       </a:lvl4pPr>
-      <a:lvl5pPr marL="1543050" indent="-171450" algn="l" defTabSz="685800" rtl="0" eaLnBrk="1" latinLnBrk="0" hangingPunct="1">
+      <a:lvl5pPr marL="1433802" indent="-159311" algn="l" defTabSz="637245" rtl="0" eaLnBrk="1" latinLnBrk="0" hangingPunct="1">
         <a:lnSpc>
           <a:spcPct val="90000"/>
         </a:lnSpc>
         <a:spcBef>
-          <a:spcPts val="375"/>
+          <a:spcPts val="348"/>
         </a:spcBef>
         <a:buFont typeface="Arial" panose="020B0604020202020204" pitchFamily="34" charset="0"/>
         <a:buChar char="•"/>
-        <a:defRPr sz="1350" kern="1200">
+        <a:defRPr sz="1254" kern="1200">
           <a:solidFill>
             <a:schemeClr val="tx1"/>
           </a:solidFill>
@@ -5058,16 +5353,16 @@
           <a:cs typeface="+mn-cs"/>
         </a:defRPr>
       </a:lvl5pPr>
-      <a:lvl6pPr marL="1885950" indent="-171450" algn="l" defTabSz="685800" rtl="0" eaLnBrk="1" latinLnBrk="0" hangingPunct="1">
+      <a:lvl6pPr marL="1752425" indent="-159311" algn="l" defTabSz="637245" rtl="0" eaLnBrk="1" latinLnBrk="0" hangingPunct="1">
         <a:lnSpc>
           <a:spcPct val="90000"/>
         </a:lnSpc>
         <a:spcBef>
-          <a:spcPts val="375"/>
+          <a:spcPts val="348"/>
         </a:spcBef>
         <a:buFont typeface="Arial" panose="020B0604020202020204" pitchFamily="34" charset="0"/>
         <a:buChar char="•"/>
-        <a:defRPr sz="1350" kern="1200">
+        <a:defRPr sz="1254" kern="1200">
           <a:solidFill>
             <a:schemeClr val="tx1"/>
           </a:solidFill>
@@ -5076,16 +5371,16 @@
           <a:cs typeface="+mn-cs"/>
         </a:defRPr>
       </a:lvl6pPr>
-      <a:lvl7pPr marL="2228850" indent="-171450" algn="l" defTabSz="685800" rtl="0" eaLnBrk="1" latinLnBrk="0" hangingPunct="1">
+      <a:lvl7pPr marL="2071047" indent="-159311" algn="l" defTabSz="637245" rtl="0" eaLnBrk="1" latinLnBrk="0" hangingPunct="1">
         <a:lnSpc>
           <a:spcPct val="90000"/>
         </a:lnSpc>
         <a:spcBef>
-          <a:spcPts val="375"/>
+          <a:spcPts val="348"/>
         </a:spcBef>
         <a:buFont typeface="Arial" panose="020B0604020202020204" pitchFamily="34" charset="0"/>
         <a:buChar char="•"/>
-        <a:defRPr sz="1350" kern="1200">
+        <a:defRPr sz="1254" kern="1200">
           <a:solidFill>
             <a:schemeClr val="tx1"/>
           </a:solidFill>
@@ -5094,16 +5389,16 @@
           <a:cs typeface="+mn-cs"/>
         </a:defRPr>
       </a:lvl7pPr>
-      <a:lvl8pPr marL="2571750" indent="-171450" algn="l" defTabSz="685800" rtl="0" eaLnBrk="1" latinLnBrk="0" hangingPunct="1">
+      <a:lvl8pPr marL="2389670" indent="-159311" algn="l" defTabSz="637245" rtl="0" eaLnBrk="1" latinLnBrk="0" hangingPunct="1">
         <a:lnSpc>
           <a:spcPct val="90000"/>
         </a:lnSpc>
         <a:spcBef>
-          <a:spcPts val="375"/>
+          <a:spcPts val="348"/>
         </a:spcBef>
         <a:buFont typeface="Arial" panose="020B0604020202020204" pitchFamily="34" charset="0"/>
         <a:buChar char="•"/>
-        <a:defRPr sz="1350" kern="1200">
+        <a:defRPr sz="1254" kern="1200">
           <a:solidFill>
             <a:schemeClr val="tx1"/>
           </a:solidFill>
@@ -5112,16 +5407,16 @@
           <a:cs typeface="+mn-cs"/>
         </a:defRPr>
       </a:lvl8pPr>
-      <a:lvl9pPr marL="2914650" indent="-171450" algn="l" defTabSz="685800" rtl="0" eaLnBrk="1" latinLnBrk="0" hangingPunct="1">
+      <a:lvl9pPr marL="2708293" indent="-159311" algn="l" defTabSz="637245" rtl="0" eaLnBrk="1" latinLnBrk="0" hangingPunct="1">
         <a:lnSpc>
           <a:spcPct val="90000"/>
         </a:lnSpc>
         <a:spcBef>
-          <a:spcPts val="375"/>
+          <a:spcPts val="348"/>
         </a:spcBef>
         <a:buFont typeface="Arial" panose="020B0604020202020204" pitchFamily="34" charset="0"/>
         <a:buChar char="•"/>
-        <a:defRPr sz="1350" kern="1200">
+        <a:defRPr sz="1254" kern="1200">
           <a:solidFill>
             <a:schemeClr val="tx1"/>
           </a:solidFill>
@@ -5135,8 +5430,8 @@
       <a:defPPr>
         <a:defRPr lang="en-US"/>
       </a:defPPr>
-      <a:lvl1pPr marL="0" algn="l" defTabSz="685800" rtl="0" eaLnBrk="1" latinLnBrk="0" hangingPunct="1">
-        <a:defRPr sz="1350" kern="1200">
+      <a:lvl1pPr marL="0" algn="l" defTabSz="637245" rtl="0" eaLnBrk="1" latinLnBrk="0" hangingPunct="1">
+        <a:defRPr sz="1254" kern="1200">
           <a:solidFill>
             <a:schemeClr val="tx1"/>
           </a:solidFill>
@@ -5145,8 +5440,8 @@
           <a:cs typeface="+mn-cs"/>
         </a:defRPr>
       </a:lvl1pPr>
-      <a:lvl2pPr marL="342900" algn="l" defTabSz="685800" rtl="0" eaLnBrk="1" latinLnBrk="0" hangingPunct="1">
-        <a:defRPr sz="1350" kern="1200">
+      <a:lvl2pPr marL="318623" algn="l" defTabSz="637245" rtl="0" eaLnBrk="1" latinLnBrk="0" hangingPunct="1">
+        <a:defRPr sz="1254" kern="1200">
           <a:solidFill>
             <a:schemeClr val="tx1"/>
           </a:solidFill>
@@ -5155,8 +5450,8 @@
           <a:cs typeface="+mn-cs"/>
         </a:defRPr>
       </a:lvl2pPr>
-      <a:lvl3pPr marL="685800" algn="l" defTabSz="685800" rtl="0" eaLnBrk="1" latinLnBrk="0" hangingPunct="1">
-        <a:defRPr sz="1350" kern="1200">
+      <a:lvl3pPr marL="637245" algn="l" defTabSz="637245" rtl="0" eaLnBrk="1" latinLnBrk="0" hangingPunct="1">
+        <a:defRPr sz="1254" kern="1200">
           <a:solidFill>
             <a:schemeClr val="tx1"/>
           </a:solidFill>
@@ -5165,8 +5460,8 @@
           <a:cs typeface="+mn-cs"/>
         </a:defRPr>
       </a:lvl3pPr>
-      <a:lvl4pPr marL="1028700" algn="l" defTabSz="685800" rtl="0" eaLnBrk="1" latinLnBrk="0" hangingPunct="1">
-        <a:defRPr sz="1350" kern="1200">
+      <a:lvl4pPr marL="955868" algn="l" defTabSz="637245" rtl="0" eaLnBrk="1" latinLnBrk="0" hangingPunct="1">
+        <a:defRPr sz="1254" kern="1200">
           <a:solidFill>
             <a:schemeClr val="tx1"/>
           </a:solidFill>
@@ -5175,8 +5470,8 @@
           <a:cs typeface="+mn-cs"/>
         </a:defRPr>
       </a:lvl4pPr>
-      <a:lvl5pPr marL="1371600" algn="l" defTabSz="685800" rtl="0" eaLnBrk="1" latinLnBrk="0" hangingPunct="1">
-        <a:defRPr sz="1350" kern="1200">
+      <a:lvl5pPr marL="1274491" algn="l" defTabSz="637245" rtl="0" eaLnBrk="1" latinLnBrk="0" hangingPunct="1">
+        <a:defRPr sz="1254" kern="1200">
           <a:solidFill>
             <a:schemeClr val="tx1"/>
           </a:solidFill>
@@ -5185,8 +5480,8 @@
           <a:cs typeface="+mn-cs"/>
         </a:defRPr>
       </a:lvl5pPr>
-      <a:lvl6pPr marL="1714500" algn="l" defTabSz="685800" rtl="0" eaLnBrk="1" latinLnBrk="0" hangingPunct="1">
-        <a:defRPr sz="1350" kern="1200">
+      <a:lvl6pPr marL="1593113" algn="l" defTabSz="637245" rtl="0" eaLnBrk="1" latinLnBrk="0" hangingPunct="1">
+        <a:defRPr sz="1254" kern="1200">
           <a:solidFill>
             <a:schemeClr val="tx1"/>
           </a:solidFill>
@@ -5195,8 +5490,8 @@
           <a:cs typeface="+mn-cs"/>
         </a:defRPr>
       </a:lvl6pPr>
-      <a:lvl7pPr marL="2057400" algn="l" defTabSz="685800" rtl="0" eaLnBrk="1" latinLnBrk="0" hangingPunct="1">
-        <a:defRPr sz="1350" kern="1200">
+      <a:lvl7pPr marL="1911736" algn="l" defTabSz="637245" rtl="0" eaLnBrk="1" latinLnBrk="0" hangingPunct="1">
+        <a:defRPr sz="1254" kern="1200">
           <a:solidFill>
             <a:schemeClr val="tx1"/>
           </a:solidFill>
@@ -5205,8 +5500,8 @@
           <a:cs typeface="+mn-cs"/>
         </a:defRPr>
       </a:lvl7pPr>
-      <a:lvl8pPr marL="2400300" algn="l" defTabSz="685800" rtl="0" eaLnBrk="1" latinLnBrk="0" hangingPunct="1">
-        <a:defRPr sz="1350" kern="1200">
+      <a:lvl8pPr marL="2230359" algn="l" defTabSz="637245" rtl="0" eaLnBrk="1" latinLnBrk="0" hangingPunct="1">
+        <a:defRPr sz="1254" kern="1200">
           <a:solidFill>
             <a:schemeClr val="tx1"/>
           </a:solidFill>
@@ -5215,8 +5510,8 @@
           <a:cs typeface="+mn-cs"/>
         </a:defRPr>
       </a:lvl8pPr>
-      <a:lvl9pPr marL="2743200" algn="l" defTabSz="685800" rtl="0" eaLnBrk="1" latinLnBrk="0" hangingPunct="1">
-        <a:defRPr sz="1350" kern="1200">
+      <a:lvl9pPr marL="2548981" algn="l" defTabSz="637245" rtl="0" eaLnBrk="1" latinLnBrk="0" hangingPunct="1">
+        <a:defRPr sz="1254" kern="1200">
           <a:solidFill>
             <a:schemeClr val="tx1"/>
           </a:solidFill>
@@ -5249,10 +5544,10 @@
       </p:grpSpPr>
       <p:pic>
         <p:nvPicPr>
-          <p:cNvPr id="5" name="Picture 4">
+          <p:cNvPr id="23" name="Picture 22">
             <a:extLst>
               <a:ext uri="{FF2B5EF4-FFF2-40B4-BE49-F238E27FC236}">
-                <a16:creationId xmlns:a16="http://schemas.microsoft.com/office/drawing/2014/main" id="{71497A23-CDB0-4ABF-AD97-4B4D06C43950}"/>
+                <a16:creationId xmlns:a16="http://schemas.microsoft.com/office/drawing/2014/main" id="{FC93BB72-4250-4FF7-8C1A-3269CCFC96E7}"/>
               </a:ext>
             </a:extLst>
           </p:cNvPr>
@@ -5268,7 +5563,7 @@
         </p:blipFill>
         <p:spPr>
           <a:xfrm>
-            <a:off x="748145" y="1002077"/>
+            <a:off x="676895" y="527073"/>
             <a:ext cx="4746332" cy="4820445"/>
           </a:xfrm>
           <a:prstGeom prst="rect">
@@ -5278,10 +5573,10 @@
       </p:pic>
       <p:pic>
         <p:nvPicPr>
-          <p:cNvPr id="4" name="Immagine 11">
+          <p:cNvPr id="24" name="Immagine 11">
             <a:extLst>
               <a:ext uri="{FF2B5EF4-FFF2-40B4-BE49-F238E27FC236}">
-                <a16:creationId xmlns:a16="http://schemas.microsoft.com/office/drawing/2014/main" id="{6580E3A3-98EB-474C-9B23-F29E015557C6}"/>
+                <a16:creationId xmlns:a16="http://schemas.microsoft.com/office/drawing/2014/main" id="{C9A434EE-6A34-48FE-B0FB-E538AE4F42F7}"/>
               </a:ext>
             </a:extLst>
           </p:cNvPr>
@@ -5297,7 +5592,7 @@
         </p:blipFill>
         <p:spPr>
           <a:xfrm>
-            <a:off x="862577" y="5130432"/>
+            <a:off x="791327" y="4655428"/>
             <a:ext cx="1323590" cy="594000"/>
           </a:xfrm>
           <a:prstGeom prst="rect">
@@ -5310,10 +5605,10 @@
       </p:pic>
       <p:pic>
         <p:nvPicPr>
-          <p:cNvPr id="6" name="Immagine 4">
+          <p:cNvPr id="25" name="Immagine 4">
             <a:extLst>
               <a:ext uri="{FF2B5EF4-FFF2-40B4-BE49-F238E27FC236}">
-                <a16:creationId xmlns:a16="http://schemas.microsoft.com/office/drawing/2014/main" id="{783B8D77-C097-4D52-895A-863A3ECC19CE}"/>
+                <a16:creationId xmlns:a16="http://schemas.microsoft.com/office/drawing/2014/main" id="{6E3EB8A4-2C7D-44B9-9772-2CE2BE5DAB36}"/>
               </a:ext>
             </a:extLst>
           </p:cNvPr>
@@ -5329,7 +5624,7 @@
         </p:blipFill>
         <p:spPr>
           <a:xfrm>
-            <a:off x="5487972" y="1022215"/>
+            <a:off x="5416722" y="547211"/>
             <a:ext cx="409794" cy="4820445"/>
           </a:xfrm>
           <a:prstGeom prst="rect">
@@ -5339,10 +5634,10 @@
       </p:pic>
       <p:sp>
         <p:nvSpPr>
-          <p:cNvPr id="7" name="CasellaDiTesto 5">
+          <p:cNvPr id="26" name="CasellaDiTesto 5">
             <a:extLst>
               <a:ext uri="{FF2B5EF4-FFF2-40B4-BE49-F238E27FC236}">
-                <a16:creationId xmlns:a16="http://schemas.microsoft.com/office/drawing/2014/main" id="{E2E634FE-00B6-413D-86F2-E09E1E2C0E78}"/>
+                <a16:creationId xmlns:a16="http://schemas.microsoft.com/office/drawing/2014/main" id="{39AC489C-A4E6-454E-B401-16958F5EC509}"/>
               </a:ext>
             </a:extLst>
           </p:cNvPr>
@@ -5351,7 +5646,7 @@
         </p:nvSpPr>
         <p:spPr>
           <a:xfrm>
-            <a:off x="5821515" y="1111261"/>
+            <a:off x="5750265" y="636257"/>
             <a:ext cx="832105" cy="307777"/>
           </a:xfrm>
           <a:prstGeom prst="rect">
@@ -5377,10 +5672,10 @@
       </p:sp>
       <p:sp>
         <p:nvSpPr>
-          <p:cNvPr id="8" name="CasellaDiTesto 6">
+          <p:cNvPr id="27" name="CasellaDiTesto 6">
             <a:extLst>
               <a:ext uri="{FF2B5EF4-FFF2-40B4-BE49-F238E27FC236}">
-                <a16:creationId xmlns:a16="http://schemas.microsoft.com/office/drawing/2014/main" id="{2926EFA7-3AD0-46E7-943D-4C5A042CEC60}"/>
+                <a16:creationId xmlns:a16="http://schemas.microsoft.com/office/drawing/2014/main" id="{17796779-4FF0-497F-A00B-74A94824D894}"/>
               </a:ext>
             </a:extLst>
           </p:cNvPr>
@@ -5389,7 +5684,7 @@
         </p:nvSpPr>
         <p:spPr>
           <a:xfrm>
-            <a:off x="5821515" y="1977704"/>
+            <a:off x="5750265" y="1502700"/>
             <a:ext cx="832105" cy="307777"/>
           </a:xfrm>
           <a:prstGeom prst="rect">
@@ -5415,10 +5710,10 @@
       </p:sp>
       <p:sp>
         <p:nvSpPr>
-          <p:cNvPr id="9" name="CasellaDiTesto 7">
+          <p:cNvPr id="28" name="CasellaDiTesto 7">
             <a:extLst>
               <a:ext uri="{FF2B5EF4-FFF2-40B4-BE49-F238E27FC236}">
-                <a16:creationId xmlns:a16="http://schemas.microsoft.com/office/drawing/2014/main" id="{617555FA-67B3-448B-879D-95A44DEBF33F}"/>
+                <a16:creationId xmlns:a16="http://schemas.microsoft.com/office/drawing/2014/main" id="{19544C9A-A0F2-43DF-B4D9-F51CCAD846EC}"/>
               </a:ext>
             </a:extLst>
           </p:cNvPr>
@@ -5427,7 +5722,7 @@
         </p:nvSpPr>
         <p:spPr>
           <a:xfrm>
-            <a:off x="5821515" y="2830674"/>
+            <a:off x="5750265" y="2355670"/>
             <a:ext cx="832105" cy="307777"/>
           </a:xfrm>
           <a:prstGeom prst="rect">
@@ -5453,10 +5748,10 @@
       </p:sp>
       <p:sp>
         <p:nvSpPr>
-          <p:cNvPr id="10" name="CasellaDiTesto 8">
+          <p:cNvPr id="29" name="CasellaDiTesto 8">
             <a:extLst>
               <a:ext uri="{FF2B5EF4-FFF2-40B4-BE49-F238E27FC236}">
-                <a16:creationId xmlns:a16="http://schemas.microsoft.com/office/drawing/2014/main" id="{6CBFCAE6-AC62-4671-96C1-432C5749466E}"/>
+                <a16:creationId xmlns:a16="http://schemas.microsoft.com/office/drawing/2014/main" id="{F0A06D56-629C-4C5C-9A2D-C5377D3EC08C}"/>
               </a:ext>
             </a:extLst>
           </p:cNvPr>
@@ -5465,7 +5760,7 @@
         </p:nvSpPr>
         <p:spPr>
           <a:xfrm>
-            <a:off x="5821515" y="3688061"/>
+            <a:off x="5750265" y="3213057"/>
             <a:ext cx="832105" cy="307777"/>
           </a:xfrm>
           <a:prstGeom prst="rect">
@@ -5491,10 +5786,10 @@
       </p:sp>
       <p:sp>
         <p:nvSpPr>
-          <p:cNvPr id="11" name="CasellaDiTesto 9">
+          <p:cNvPr id="30" name="CasellaDiTesto 9">
             <a:extLst>
               <a:ext uri="{FF2B5EF4-FFF2-40B4-BE49-F238E27FC236}">
-                <a16:creationId xmlns:a16="http://schemas.microsoft.com/office/drawing/2014/main" id="{A1603981-D9F7-438A-B23E-C3488A35C546}"/>
+                <a16:creationId xmlns:a16="http://schemas.microsoft.com/office/drawing/2014/main" id="{CDBCF8F0-D304-44A6-8F91-78C01E4FF2BB}"/>
               </a:ext>
             </a:extLst>
           </p:cNvPr>
@@ -5503,7 +5798,7 @@
         </p:nvSpPr>
         <p:spPr>
           <a:xfrm>
-            <a:off x="5821515" y="4573525"/>
+            <a:off x="5750265" y="4098521"/>
             <a:ext cx="832105" cy="307777"/>
           </a:xfrm>
           <a:prstGeom prst="rect">
@@ -5529,10 +5824,10 @@
       </p:sp>
       <p:sp>
         <p:nvSpPr>
-          <p:cNvPr id="12" name="CasellaDiTesto 10">
+          <p:cNvPr id="31" name="CasellaDiTesto 10">
             <a:extLst>
               <a:ext uri="{FF2B5EF4-FFF2-40B4-BE49-F238E27FC236}">
-                <a16:creationId xmlns:a16="http://schemas.microsoft.com/office/drawing/2014/main" id="{CBF652F5-26AA-4C82-8C28-0944A2A23360}"/>
+                <a16:creationId xmlns:a16="http://schemas.microsoft.com/office/drawing/2014/main" id="{3E772AC3-EED8-4446-81E6-5E33D28BFCA4}"/>
               </a:ext>
             </a:extLst>
           </p:cNvPr>
@@ -5541,7 +5836,7 @@
         </p:nvSpPr>
         <p:spPr>
           <a:xfrm>
-            <a:off x="5821515" y="5418432"/>
+            <a:off x="5750265" y="4943428"/>
             <a:ext cx="832105" cy="307777"/>
           </a:xfrm>
           <a:prstGeom prst="rect">
@@ -5567,10 +5862,10 @@
       </p:sp>
       <p:sp>
         <p:nvSpPr>
-          <p:cNvPr id="13" name="CasellaDiTesto 12">
+          <p:cNvPr id="32" name="CasellaDiTesto 12">
             <a:extLst>
               <a:ext uri="{FF2B5EF4-FFF2-40B4-BE49-F238E27FC236}">
-                <a16:creationId xmlns:a16="http://schemas.microsoft.com/office/drawing/2014/main" id="{1A757164-0531-4C8E-9583-91FD51B3C001}"/>
+                <a16:creationId xmlns:a16="http://schemas.microsoft.com/office/drawing/2014/main" id="{863F6727-CF58-40B7-9A1B-C4A1B693A1BE}"/>
               </a:ext>
             </a:extLst>
           </p:cNvPr>
@@ -5579,7 +5874,7 @@
         </p:nvSpPr>
         <p:spPr>
           <a:xfrm rot="16200000">
-            <a:off x="3872697" y="3268479"/>
+            <a:off x="3801447" y="2793475"/>
             <a:ext cx="4840583" cy="307777"/>
           </a:xfrm>
           <a:prstGeom prst="rect">
@@ -5613,10 +5908,10 @@
       </p:sp>
       <p:pic>
         <p:nvPicPr>
-          <p:cNvPr id="14" name="Picture 13">
+          <p:cNvPr id="33" name="Picture 32">
             <a:extLst>
               <a:ext uri="{FF2B5EF4-FFF2-40B4-BE49-F238E27FC236}">
-                <a16:creationId xmlns:a16="http://schemas.microsoft.com/office/drawing/2014/main" id="{0F8D96D3-579C-4D0C-BC86-1DA1491118E9}"/>
+                <a16:creationId xmlns:a16="http://schemas.microsoft.com/office/drawing/2014/main" id="{B3D2070A-4316-43D4-A099-63612CAACEB8}"/>
               </a:ext>
             </a:extLst>
           </p:cNvPr>
@@ -5632,7 +5927,7 @@
         </p:blipFill>
         <p:spPr>
           <a:xfrm>
-            <a:off x="342255" y="473221"/>
+            <a:off x="271005" y="-1783"/>
             <a:ext cx="5152221" cy="411615"/>
           </a:xfrm>
           <a:prstGeom prst="rect">
@@ -5642,10 +5937,10 @@
       </p:pic>
       <p:sp>
         <p:nvSpPr>
-          <p:cNvPr id="15" name="CasellaDiTesto 5">
+          <p:cNvPr id="34" name="CasellaDiTesto 5">
             <a:extLst>
               <a:ext uri="{FF2B5EF4-FFF2-40B4-BE49-F238E27FC236}">
-                <a16:creationId xmlns:a16="http://schemas.microsoft.com/office/drawing/2014/main" id="{FCA23189-1D1B-4D53-95E7-6B2D3AC2DEF3}"/>
+                <a16:creationId xmlns:a16="http://schemas.microsoft.com/office/drawing/2014/main" id="{10ECE43D-05A9-4654-847C-6AC2D58F13F0}"/>
               </a:ext>
             </a:extLst>
           </p:cNvPr>
@@ -5654,7 +5949,7 @@
         </p:nvSpPr>
         <p:spPr>
           <a:xfrm>
-            <a:off x="0" y="1172224"/>
+            <a:off x="-71250" y="697220"/>
             <a:ext cx="808007" cy="307777"/>
           </a:xfrm>
           <a:prstGeom prst="rect">
@@ -5692,10 +5987,10 @@
       </p:sp>
       <p:sp>
         <p:nvSpPr>
-          <p:cNvPr id="16" name="CasellaDiTesto 5">
+          <p:cNvPr id="35" name="CasellaDiTesto 5">
             <a:extLst>
               <a:ext uri="{FF2B5EF4-FFF2-40B4-BE49-F238E27FC236}">
-                <a16:creationId xmlns:a16="http://schemas.microsoft.com/office/drawing/2014/main" id="{88227FBA-93A5-4F8D-AF35-B816179790A1}"/>
+                <a16:creationId xmlns:a16="http://schemas.microsoft.com/office/drawing/2014/main" id="{DBE5608E-8A3D-4993-8F3A-8A5B0110E634}"/>
               </a:ext>
             </a:extLst>
           </p:cNvPr>
@@ -5704,7 +5999,7 @@
         </p:nvSpPr>
         <p:spPr>
           <a:xfrm>
-            <a:off x="-4509" y="2076008"/>
+            <a:off x="-75759" y="1601004"/>
             <a:ext cx="808007" cy="307777"/>
           </a:xfrm>
           <a:prstGeom prst="rect">
@@ -5742,10 +6037,10 @@
       </p:sp>
       <p:sp>
         <p:nvSpPr>
-          <p:cNvPr id="17" name="CasellaDiTesto 5">
+          <p:cNvPr id="36" name="CasellaDiTesto 5">
             <a:extLst>
               <a:ext uri="{FF2B5EF4-FFF2-40B4-BE49-F238E27FC236}">
-                <a16:creationId xmlns:a16="http://schemas.microsoft.com/office/drawing/2014/main" id="{EF39643F-A024-47E7-BF13-66CD4E8FB6BB}"/>
+                <a16:creationId xmlns:a16="http://schemas.microsoft.com/office/drawing/2014/main" id="{393B2F86-5E11-417C-B41C-064C48DA7A1C}"/>
               </a:ext>
             </a:extLst>
           </p:cNvPr>
@@ -5754,7 +6049,7 @@
         </p:nvSpPr>
         <p:spPr>
           <a:xfrm>
-            <a:off x="-4509" y="2979792"/>
+            <a:off x="-75759" y="2504788"/>
             <a:ext cx="818447" cy="307777"/>
           </a:xfrm>
           <a:prstGeom prst="rect">
@@ -5792,10 +6087,10 @@
       </p:sp>
       <p:sp>
         <p:nvSpPr>
-          <p:cNvPr id="18" name="CasellaDiTesto 5">
+          <p:cNvPr id="37" name="CasellaDiTesto 5">
             <a:extLst>
               <a:ext uri="{FF2B5EF4-FFF2-40B4-BE49-F238E27FC236}">
-                <a16:creationId xmlns:a16="http://schemas.microsoft.com/office/drawing/2014/main" id="{CEE2F4C8-D41E-48DF-8657-64FB651F88AE}"/>
+                <a16:creationId xmlns:a16="http://schemas.microsoft.com/office/drawing/2014/main" id="{7F6D35CC-75E0-4C45-AD36-14EED76F50E2}"/>
               </a:ext>
             </a:extLst>
           </p:cNvPr>
@@ -5804,7 +6099,7 @@
         </p:nvSpPr>
         <p:spPr>
           <a:xfrm>
-            <a:off x="0" y="3874051"/>
+            <a:off x="-71250" y="3399047"/>
             <a:ext cx="808717" cy="307777"/>
           </a:xfrm>
           <a:prstGeom prst="rect">
@@ -5842,10 +6137,10 @@
       </p:sp>
       <p:sp>
         <p:nvSpPr>
-          <p:cNvPr id="19" name="CasellaDiTesto 5">
+          <p:cNvPr id="38" name="CasellaDiTesto 5">
             <a:extLst>
               <a:ext uri="{FF2B5EF4-FFF2-40B4-BE49-F238E27FC236}">
-                <a16:creationId xmlns:a16="http://schemas.microsoft.com/office/drawing/2014/main" id="{0CE99295-51E1-4F3B-97F9-621D25925B5E}"/>
+                <a16:creationId xmlns:a16="http://schemas.microsoft.com/office/drawing/2014/main" id="{F1A5061F-8D2B-4F88-B593-11CCBBBBB0E8}"/>
               </a:ext>
             </a:extLst>
           </p:cNvPr>
@@ -5854,7 +6149,7 @@
         </p:nvSpPr>
         <p:spPr>
           <a:xfrm>
-            <a:off x="0" y="4756373"/>
+            <a:off x="-71250" y="4281369"/>
             <a:ext cx="803498" cy="307777"/>
           </a:xfrm>
           <a:prstGeom prst="rect">
@@ -5892,10 +6187,10 @@
       </p:sp>
       <p:sp>
         <p:nvSpPr>
-          <p:cNvPr id="21" name="CasellaDiTesto 9">
+          <p:cNvPr id="39" name="CasellaDiTesto 9">
             <a:extLst>
               <a:ext uri="{FF2B5EF4-FFF2-40B4-BE49-F238E27FC236}">
-                <a16:creationId xmlns:a16="http://schemas.microsoft.com/office/drawing/2014/main" id="{73B7C62C-9EBC-4F8F-AD08-4C121768BABF}"/>
+                <a16:creationId xmlns:a16="http://schemas.microsoft.com/office/drawing/2014/main" id="{763AE0A3-3C07-4AB5-B516-4695BA4E9F5E}"/>
               </a:ext>
             </a:extLst>
           </p:cNvPr>
@@ -5904,7 +6199,7 @@
         </p:nvSpPr>
         <p:spPr>
           <a:xfrm>
-            <a:off x="566641" y="5823190"/>
+            <a:off x="495391" y="5348186"/>
             <a:ext cx="5254873" cy="307777"/>
           </a:xfrm>
           <a:prstGeom prst="rect">
@@ -5955,7 +6250,7 @@
 <file path=ppt/theme/theme1.xml><?xml version="1.0" encoding="utf-8"?>
 <a:theme xmlns:a="http://schemas.openxmlformats.org/drawingml/2006/main" name="Tema di Office">
   <a:themeElements>
-    <a:clrScheme name="Tema di Office">
+    <a:clrScheme name="Office Theme">
       <a:dk1>
         <a:sysClr val="windowText" lastClr="000000"/>
       </a:dk1>
@@ -5993,7 +6288,7 @@
         <a:srgbClr val="954F72"/>
       </a:folHlink>
     </a:clrScheme>
-    <a:fontScheme name="Tema di Office">
+    <a:fontScheme name="Office Theme">
       <a:majorFont>
         <a:latin typeface="Calibri Light" panose="020F0302020204030204"/>
         <a:ea typeface=""/>
@@ -6065,7 +6360,7 @@
         <a:font script="Geor" typeface="Sylfaen"/>
       </a:minorFont>
     </a:fontScheme>
-    <a:fmtScheme name="Tema di Office">
+    <a:fmtScheme name="Office Theme">
       <a:fillStyleLst>
         <a:solidFill>
           <a:schemeClr val="phClr"/>

</xml_diff>